<commit_message>
New sih updated pptx
</commit_message>
<xml_diff>
--- a/sih.pptx
+++ b/sih.pptx
@@ -11,7 +11,7 @@
     <p:sldId id="291" r:id="rId2"/>
     <p:sldId id="281" r:id="rId3"/>
     <p:sldId id="290" r:id="rId4"/>
-    <p:sldId id="293" r:id="rId5"/>
+    <p:sldId id="298" r:id="rId5"/>
     <p:sldId id="294" r:id="rId6"/>
     <p:sldId id="296" r:id="rId7"/>
     <p:sldId id="297" r:id="rId8"/>
@@ -262,7 +262,7 @@
             <a:fld id="{C4D5ADD5-2BBC-4A94-8F86-D9013941F742}" type="datetimeFigureOut">
               <a:rPr lang="en-US"/>
               <a:pPr/>
-              <a:t>9/8/2025</a:t>
+              <a:t>9/9/2025</a:t>
             </a:fld>
             <a:endParaRPr lang="en-US"/>
           </a:p>
@@ -964,184 +964,6 @@
                 <a:tabLst/>
                 <a:defRPr/>
               </a:pPr>
-              <a:t>4</a:t>
-            </a:fld>
-            <a:endParaRPr kumimoji="0" lang="en-US" sz="1200" b="0" i="0" u="none" strike="noStrike" kern="1200" cap="none" spc="0" normalizeH="0" baseline="0" noProof="0">
-              <a:ln>
-                <a:noFill/>
-              </a:ln>
-              <a:solidFill>
-                <a:prstClr val="black"/>
-              </a:solidFill>
-              <a:effectLst/>
-              <a:uLnTx/>
-              <a:uFillTx/>
-              <a:latin typeface="Calibri" pitchFamily="34" charset="0"/>
-              <a:ea typeface="ＭＳ Ｐゴシック" pitchFamily="1" charset="-128"/>
-              <a:cs typeface="+mn-cs"/>
-            </a:endParaRPr>
-          </a:p>
-        </p:txBody>
-      </p:sp>
-    </p:spTree>
-    <p:extLst>
-      <p:ext uri="{BB962C8B-B14F-4D97-AF65-F5344CB8AC3E}">
-        <p14:creationId xmlns:p14="http://schemas.microsoft.com/office/powerpoint/2010/main" val="3773505461"/>
-      </p:ext>
-    </p:extLst>
-  </p:cSld>
-  <p:clrMapOvr>
-    <a:masterClrMapping/>
-  </p:clrMapOvr>
-</p:notes>
-</file>
-
-<file path=ppt/notesSlides/notesSlide4.xml><?xml version="1.0" encoding="utf-8"?>
-<p:notes xmlns:a="http://schemas.openxmlformats.org/drawingml/2006/main" xmlns:r="http://schemas.openxmlformats.org/officeDocument/2006/relationships" xmlns:p="http://schemas.openxmlformats.org/presentationml/2006/main">
-  <p:cSld>
-    <p:spTree>
-      <p:nvGrpSpPr>
-        <p:cNvPr id="1" name=""/>
-        <p:cNvGrpSpPr/>
-        <p:nvPr/>
-      </p:nvGrpSpPr>
-      <p:grpSpPr>
-        <a:xfrm>
-          <a:off x="0" y="0"/>
-          <a:ext cx="0" cy="0"/>
-          <a:chOff x="0" y="0"/>
-          <a:chExt cx="0" cy="0"/>
-        </a:xfrm>
-      </p:grpSpPr>
-      <p:sp>
-        <p:nvSpPr>
-          <p:cNvPr id="18433" name="Slide Image Placeholder 1"/>
-          <p:cNvSpPr>
-            <a:spLocks noGrp="1" noRot="1" noChangeAspect="1"/>
-          </p:cNvSpPr>
-          <p:nvPr>
-            <p:ph type="sldImg"/>
-          </p:nvPr>
-        </p:nvSpPr>
-        <p:spPr bwMode="auto">
-          <a:xfrm>
-            <a:off x="381000" y="685800"/>
-            <a:ext cx="6096000" cy="3429000"/>
-          </a:xfrm>
-          <a:noFill/>
-          <a:ln>
-            <a:solidFill>
-              <a:srgbClr val="000000"/>
-            </a:solidFill>
-            <a:miter lim="800000"/>
-            <a:headEnd/>
-            <a:tailEnd/>
-          </a:ln>
-        </p:spPr>
-      </p:sp>
-      <p:sp>
-        <p:nvSpPr>
-          <p:cNvPr id="18434" name="Notes Placeholder 2"/>
-          <p:cNvSpPr>
-            <a:spLocks noGrp="1"/>
-          </p:cNvSpPr>
-          <p:nvPr>
-            <p:ph type="body" idx="1"/>
-          </p:nvPr>
-        </p:nvSpPr>
-        <p:spPr bwMode="auto">
-          <a:noFill/>
-        </p:spPr>
-        <p:txBody>
-          <a:bodyPr wrap="square" numCol="1" anchor="t" anchorCtr="0" compatLnSpc="1">
-            <a:prstTxWarp prst="textNoShape">
-              <a:avLst/>
-            </a:prstTxWarp>
-          </a:bodyPr>
-          <a:lstStyle/>
-          <a:p>
-            <a:pPr eaLnBrk="1" hangingPunct="1">
-              <a:spcBef>
-                <a:spcPct val="0"/>
-              </a:spcBef>
-            </a:pPr>
-            <a:endParaRPr lang="en-US">
-              <a:ea typeface="ＭＳ Ｐゴシック" pitchFamily="1" charset="-128"/>
-            </a:endParaRPr>
-          </a:p>
-        </p:txBody>
-      </p:sp>
-      <p:sp>
-        <p:nvSpPr>
-          <p:cNvPr id="18435" name="Slide Number Placeholder 3"/>
-          <p:cNvSpPr>
-            <a:spLocks noGrp="1"/>
-          </p:cNvSpPr>
-          <p:nvPr>
-            <p:ph type="sldNum" sz="quarter" idx="5"/>
-          </p:nvPr>
-        </p:nvSpPr>
-        <p:spPr bwMode="auto">
-          <a:noFill/>
-          <a:ln>
-            <a:miter lim="800000"/>
-            <a:headEnd/>
-            <a:tailEnd/>
-          </a:ln>
-        </p:spPr>
-        <p:txBody>
-          <a:bodyPr/>
-          <a:lstStyle/>
-          <a:p>
-            <a:pPr marL="0" marR="0" lvl="0" indent="0" algn="r" defTabSz="457200" rtl="0" eaLnBrk="1" fontAlgn="base" latinLnBrk="0" hangingPunct="1">
-              <a:lnSpc>
-                <a:spcPct val="100000"/>
-              </a:lnSpc>
-              <a:spcBef>
-                <a:spcPct val="0"/>
-              </a:spcBef>
-              <a:spcAft>
-                <a:spcPct val="0"/>
-              </a:spcAft>
-              <a:buClrTx/>
-              <a:buSzTx/>
-              <a:buFontTx/>
-              <a:buNone/>
-              <a:tabLst/>
-              <a:defRPr/>
-            </a:pPr>
-            <a:fld id="{0CA7B74D-3791-4AC6-8451-F10DBCCCDD9A}" type="slidenum">
-              <a:rPr kumimoji="0" lang="en-US" sz="1200" b="0" i="0" u="none" strike="noStrike" kern="1200" cap="none" spc="0" normalizeH="0" baseline="0" noProof="0">
-                <a:ln>
-                  <a:noFill/>
-                </a:ln>
-                <a:solidFill>
-                  <a:prstClr val="black"/>
-                </a:solidFill>
-                <a:effectLst/>
-                <a:uLnTx/>
-                <a:uFillTx/>
-                <a:latin typeface="Calibri" pitchFamily="34" charset="0"/>
-                <a:ea typeface="ＭＳ Ｐゴシック" pitchFamily="1" charset="-128"/>
-                <a:cs typeface="+mn-cs"/>
-              </a:rPr>
-              <a:pPr marL="0" marR="0" lvl="0" indent="0" algn="r" defTabSz="457200" rtl="0" eaLnBrk="1" fontAlgn="base" latinLnBrk="0" hangingPunct="1">
-                <a:lnSpc>
-                  <a:spcPct val="100000"/>
-                </a:lnSpc>
-                <a:spcBef>
-                  <a:spcPct val="0"/>
-                </a:spcBef>
-                <a:spcAft>
-                  <a:spcPct val="0"/>
-                </a:spcAft>
-                <a:buClrTx/>
-                <a:buSzTx/>
-                <a:buFontTx/>
-                <a:buNone/>
-                <a:tabLst/>
-                <a:defRPr/>
-              </a:pPr>
               <a:t>5</a:t>
             </a:fld>
             <a:endParaRPr kumimoji="0" lang="en-US" sz="1200" b="0" i="0" u="none" strike="noStrike" kern="1200" cap="none" spc="0" normalizeH="0" baseline="0" noProof="0">
@@ -1174,7 +996,7 @@
 </p:notes>
 </file>
 
-<file path=ppt/notesSlides/notesSlide5.xml><?xml version="1.0" encoding="utf-8"?>
+<file path=ppt/notesSlides/notesSlide4.xml><?xml version="1.0" encoding="utf-8"?>
 <p:notes xmlns:a="http://schemas.openxmlformats.org/drawingml/2006/main" xmlns:r="http://schemas.openxmlformats.org/officeDocument/2006/relationships" xmlns:p="http://schemas.openxmlformats.org/presentationml/2006/main">
   <p:cSld>
     <p:spTree>
@@ -1352,7 +1174,7 @@
 </p:notes>
 </file>
 
-<file path=ppt/notesSlides/notesSlide6.xml><?xml version="1.0" encoding="utf-8"?>
+<file path=ppt/notesSlides/notesSlide5.xml><?xml version="1.0" encoding="utf-8"?>
 <p:notes xmlns:a="http://schemas.openxmlformats.org/drawingml/2006/main" xmlns:r="http://schemas.openxmlformats.org/officeDocument/2006/relationships" xmlns:p="http://schemas.openxmlformats.org/presentationml/2006/main">
   <p:cSld>
     <p:spTree>
@@ -1713,7 +1535,7 @@
           <a:p>
             <a:fld id="{E60792E3-D524-454C-8AFD-A91972900BCB}" type="datetime1">
               <a:rPr lang="en-US" smtClean="0"/>
-              <a:t>9/8/2025</a:t>
+              <a:t>9/9/2025</a:t>
             </a:fld>
             <a:endParaRPr lang="en-US"/>
           </a:p>
@@ -1895,7 +1717,7 @@
           <a:p>
             <a:fld id="{053C3A68-6922-42D3-8905-ECC2D82A3469}" type="datetime1">
               <a:rPr lang="en-US" smtClean="0"/>
-              <a:t>9/8/2025</a:t>
+              <a:t>9/9/2025</a:t>
             </a:fld>
             <a:endParaRPr lang="en-US"/>
           </a:p>
@@ -2087,7 +1909,7 @@
           <a:p>
             <a:fld id="{CB69E9F4-7604-4950-A8B2-8ACDEDB1506E}" type="datetime1">
               <a:rPr lang="en-US" smtClean="0"/>
-              <a:t>9/8/2025</a:t>
+              <a:t>9/9/2025</a:t>
             </a:fld>
             <a:endParaRPr lang="en-US"/>
           </a:p>
@@ -2269,7 +2091,7 @@
           <a:p>
             <a:fld id="{708B7524-32A2-4C20-A58C-BC3BAA1042FC}" type="datetime1">
               <a:rPr lang="en-US" smtClean="0"/>
-              <a:t>9/8/2025</a:t>
+              <a:t>9/9/2025</a:t>
             </a:fld>
             <a:endParaRPr lang="en-US"/>
           </a:p>
@@ -2528,7 +2350,7 @@
           <a:p>
             <a:fld id="{1E994447-D6B2-43BB-A877-57F1A267B999}" type="datetime1">
               <a:rPr lang="en-US" smtClean="0"/>
-              <a:t>9/8/2025</a:t>
+              <a:t>9/9/2025</a:t>
             </a:fld>
             <a:endParaRPr lang="en-US"/>
           </a:p>
@@ -2827,7 +2649,7 @@
           <a:p>
             <a:fld id="{68920E16-BD35-483C-AA6B-346FC7E46DEA}" type="datetime1">
               <a:rPr lang="en-US" smtClean="0"/>
-              <a:t>9/8/2025</a:t>
+              <a:t>9/9/2025</a:t>
             </a:fld>
             <a:endParaRPr lang="en-US"/>
           </a:p>
@@ -3260,7 +3082,7 @@
           <a:p>
             <a:fld id="{2FEAC6F8-5103-4FC0-A69E-5C6AE6469DA8}" type="datetime1">
               <a:rPr lang="en-US" smtClean="0"/>
-              <a:t>9/8/2025</a:t>
+              <a:t>9/9/2025</a:t>
             </a:fld>
             <a:endParaRPr lang="en-US"/>
           </a:p>
@@ -3391,7 +3213,7 @@
           <a:p>
             <a:fld id="{C60C6921-0627-4C8F-83D5-0CF936D2FFDD}" type="datetime1">
               <a:rPr lang="en-US" smtClean="0"/>
-              <a:t>9/8/2025</a:t>
+              <a:t>9/9/2025</a:t>
             </a:fld>
             <a:endParaRPr lang="en-US"/>
           </a:p>
@@ -3500,7 +3322,7 @@
           <a:p>
             <a:fld id="{2FF08AD7-8103-40F8-983C-E2BA6BB9CBE0}" type="datetime1">
               <a:rPr lang="en-US" smtClean="0"/>
-              <a:t>9/8/2025</a:t>
+              <a:t>9/9/2025</a:t>
             </a:fld>
             <a:endParaRPr lang="en-US"/>
           </a:p>
@@ -3789,7 +3611,7 @@
           <a:p>
             <a:fld id="{DF8C06B4-9380-4A4D-AF49-A3596E17DAF5}" type="datetime1">
               <a:rPr lang="en-US" smtClean="0"/>
-              <a:t>9/8/2025</a:t>
+              <a:t>9/9/2025</a:t>
             </a:fld>
             <a:endParaRPr lang="en-US"/>
           </a:p>
@@ -4058,7 +3880,7 @@
           <a:p>
             <a:fld id="{EF7FDEF1-C582-4E22-9E77-D68326471F28}" type="datetime1">
               <a:rPr lang="en-US" smtClean="0"/>
-              <a:t>9/8/2025</a:t>
+              <a:t>9/9/2025</a:t>
             </a:fld>
             <a:endParaRPr lang="en-US"/>
           </a:p>
@@ -4301,7 +4123,7 @@
           <a:p>
             <a:fld id="{780A9602-A9A9-453F-AEF1-37B5837E02CD}" type="datetime1">
               <a:rPr lang="en-US" smtClean="0"/>
-              <a:t>9/8/2025</a:t>
+              <a:t>9/9/2025</a:t>
             </a:fld>
             <a:endParaRPr lang="en-US"/>
           </a:p>
@@ -6927,10 +6749,10 @@
       </p:grpSpPr>
       <p:sp>
         <p:nvSpPr>
-          <p:cNvPr id="10" name="Rectangle 9">
+          <p:cNvPr id="14" name="Rectangle 13">
             <a:extLst>
               <a:ext uri="{FF2B5EF4-FFF2-40B4-BE49-F238E27FC236}">
-                <a16:creationId xmlns:a16="http://schemas.microsoft.com/office/drawing/2014/main" id="{AD4F69D3-EEB0-4C4C-9434-B9960FB5854C}"/>
+                <a16:creationId xmlns:a16="http://schemas.microsoft.com/office/drawing/2014/main" id="{7F70A1DC-2B27-3AEF-A6A4-9A0ECB137FA4}"/>
               </a:ext>
             </a:extLst>
           </p:cNvPr>
@@ -7006,7 +6828,13 @@
       </p:sp>
       <p:sp>
         <p:nvSpPr>
-          <p:cNvPr id="17409" name="Title 1"/>
+          <p:cNvPr id="2" name="Title 1">
+            <a:extLst>
+              <a:ext uri="{FF2B5EF4-FFF2-40B4-BE49-F238E27FC236}">
+                <a16:creationId xmlns:a16="http://schemas.microsoft.com/office/drawing/2014/main" id="{527B829E-D46D-1273-8F21-572B1C95A3DE}"/>
+              </a:ext>
+            </a:extLst>
+          </p:cNvPr>
           <p:cNvSpPr>
             <a:spLocks noGrp="1"/>
           </p:cNvSpPr>
@@ -7019,191 +6847,216 @@
           <a:bodyPr/>
           <a:lstStyle/>
           <a:p>
-            <a:pPr eaLnBrk="1" hangingPunct="1"/>
-            <a:r>
-              <a:rPr lang="en-US" sz="3600" b="1" dirty="0">
+            <a:r>
+              <a:rPr lang="en-US" sz="3200" b="1" dirty="0">
                 <a:latin typeface="Times New Roman" panose="02020603050405020304" pitchFamily="18" charset="0"/>
                 <a:ea typeface="ＭＳ Ｐゴシック" pitchFamily="1" charset="-128"/>
                 <a:cs typeface="Times New Roman" panose="02020603050405020304" pitchFamily="18" charset="0"/>
               </a:rPr>
               <a:t>FEASIBILITY AND VIABILITY</a:t>
             </a:r>
-          </a:p>
-        </p:txBody>
-      </p:sp>
-      <p:sp>
-        <p:nvSpPr>
-          <p:cNvPr id="17410" name="TextBox 8"/>
-          <p:cNvSpPr txBox="1">
-            <a:spLocks noChangeArrowheads="1"/>
-          </p:cNvSpPr>
-          <p:nvPr/>
-        </p:nvSpPr>
-        <p:spPr bwMode="auto">
+            <a:endParaRPr lang="en-IN" sz="3200" dirty="0"/>
+          </a:p>
+        </p:txBody>
+      </p:sp>
+      <p:sp>
+        <p:nvSpPr>
+          <p:cNvPr id="3" name="Content Placeholder 2">
+            <a:extLst>
+              <a:ext uri="{FF2B5EF4-FFF2-40B4-BE49-F238E27FC236}">
+                <a16:creationId xmlns:a16="http://schemas.microsoft.com/office/drawing/2014/main" id="{CA24AF9C-1DFD-345A-FDE8-9EBF54815EB3}"/>
+              </a:ext>
+            </a:extLst>
+          </p:cNvPr>
+          <p:cNvSpPr>
+            <a:spLocks noGrp="1"/>
+          </p:cNvSpPr>
+          <p:nvPr>
+            <p:ph sz="half" idx="1"/>
+          </p:nvPr>
+        </p:nvSpPr>
+        <p:spPr>
           <a:xfrm>
-            <a:off x="609600" y="2533653"/>
-            <a:ext cx="9385300" cy="1384995"/>
+            <a:off x="609600" y="1600203"/>
+            <a:ext cx="5384800" cy="4883724"/>
           </a:xfrm>
-          <a:prstGeom prst="rect">
-            <a:avLst/>
-          </a:prstGeom>
-          <a:noFill/>
-          <a:ln w="9525">
-            <a:noFill/>
-            <a:miter lim="800000"/>
-            <a:headEnd/>
-            <a:tailEnd/>
-          </a:ln>
         </p:spPr>
         <p:txBody>
-          <a:bodyPr wrap="square">
-            <a:spAutoFit/>
-          </a:bodyPr>
+          <a:bodyPr/>
           <a:lstStyle/>
           <a:p>
-            <a:pPr marL="342900" marR="0" lvl="0" indent="-342900" algn="just" defTabSz="457200" rtl="0" eaLnBrk="1" fontAlgn="base" latinLnBrk="0" hangingPunct="1">
-              <a:lnSpc>
-                <a:spcPct val="100000"/>
-              </a:lnSpc>
-              <a:spcBef>
-                <a:spcPct val="0"/>
-              </a:spcBef>
-              <a:spcAft>
-                <a:spcPct val="0"/>
-              </a:spcAft>
-              <a:buClrTx/>
-              <a:buSzTx/>
-              <a:buFont typeface="Arial" panose="020B0604020202020204" pitchFamily="34" charset="0"/>
-              <a:buChar char="•"/>
-              <a:tabLst/>
+            <a:pPr marL="0" indent="0">
+              <a:buNone/>
+            </a:pPr>
+            <a:r>
+              <a:rPr lang="en-IN" sz="1600" b="1" dirty="0"/>
+              <a:t>Feasibility of the Idea</a:t>
+            </a:r>
+          </a:p>
+          <a:p>
+            <a:r>
+              <a:rPr lang="en-IN" sz="1600" dirty="0"/>
+              <a:t>Technically achievable using </a:t>
+            </a:r>
+            <a:r>
+              <a:rPr lang="en-IN" sz="1600" b="1" dirty="0"/>
+              <a:t>Flutter, Next.js, </a:t>
+            </a:r>
+            <a:r>
+              <a:rPr lang="en-IN" sz="1600" b="1" dirty="0" err="1"/>
+              <a:t>FastAPI</a:t>
+            </a:r>
+            <a:r>
+              <a:rPr lang="en-IN" sz="1600" b="1" dirty="0"/>
+              <a:t>, AI/ML, and Blockchain</a:t>
+            </a:r>
+            <a:r>
+              <a:rPr lang="en-IN" sz="1600" dirty="0"/>
+              <a:t>.</a:t>
+            </a:r>
+          </a:p>
+          <a:p>
+            <a:r>
+              <a:rPr lang="en-IN" sz="1600" dirty="0"/>
+              <a:t>Integrates with </a:t>
+            </a:r>
+            <a:r>
+              <a:rPr lang="en-IN" sz="1600" b="1" dirty="0"/>
+              <a:t>existing Aadhaar/Passport verification</a:t>
+            </a:r>
+            <a:r>
+              <a:rPr lang="en-IN" sz="1600" dirty="0"/>
+              <a:t> process.</a:t>
+            </a:r>
+          </a:p>
+          <a:p>
+            <a:r>
+              <a:rPr lang="en-IN" sz="1600" dirty="0"/>
+              <a:t>Real-time alerts and dashboards can be built with </a:t>
+            </a:r>
+            <a:r>
+              <a:rPr lang="en-IN" sz="1600" b="1" dirty="0"/>
+              <a:t>available infrastructure</a:t>
+            </a:r>
+            <a:r>
+              <a:rPr lang="en-IN" sz="1600" dirty="0"/>
+              <a:t>.</a:t>
+            </a:r>
+          </a:p>
+          <a:p>
+            <a:pPr marL="0" indent="0">
+              <a:buNone/>
+            </a:pPr>
+            <a:endParaRPr lang="en-IN" sz="1600" dirty="0"/>
+          </a:p>
+          <a:p>
+            <a:pPr marL="0" indent="0">
+              <a:buNone/>
+            </a:pPr>
+            <a:r>
+              <a:rPr lang="en-IN" sz="1600" b="1" dirty="0"/>
+              <a:t> Potential Challenges &amp; Risks</a:t>
+            </a:r>
+          </a:p>
+          <a:p>
+            <a:r>
+              <a:rPr lang="en-IN" sz="1600" b="1" dirty="0"/>
+              <a:t>High volume of alerts</a:t>
+            </a:r>
+            <a:r>
+              <a:rPr lang="en-IN" sz="1600" dirty="0"/>
+              <a:t> → panic button misuse &amp; false alarms.</a:t>
+            </a:r>
+          </a:p>
+          <a:p>
+            <a:r>
+              <a:rPr lang="en-IN" sz="1600" b="1" dirty="0"/>
+              <a:t>Data privacy concerns</a:t>
+            </a:r>
+            <a:r>
+              <a:rPr lang="en-IN" sz="1600" dirty="0"/>
+              <a:t> → Aadhaar/Passport + location storage.</a:t>
+            </a:r>
+          </a:p>
+          <a:p>
+            <a:r>
+              <a:rPr lang="en-IN" sz="1600" b="1" dirty="0"/>
+              <a:t>Tourist adoption issues</a:t>
+            </a:r>
+            <a:r>
+              <a:rPr lang="en-IN" sz="1600" dirty="0"/>
+              <a:t> → lack of awareness or trust.</a:t>
+            </a:r>
+          </a:p>
+          <a:p>
+            <a:r>
+              <a:rPr lang="en-IN" sz="1600" b="1" dirty="0"/>
+              <a:t>Connectivity gaps</a:t>
+            </a:r>
+            <a:r>
+              <a:rPr lang="en-IN" sz="1600" dirty="0"/>
+              <a:t> in remote/border areas.</a:t>
+            </a:r>
+          </a:p>
+          <a:p>
+            <a:r>
+              <a:rPr lang="en-IN" sz="1600" b="1" dirty="0"/>
+              <a:t>Scalability</a:t>
+            </a:r>
+            <a:r>
+              <a:rPr lang="en-IN" sz="1600" dirty="0"/>
+              <a:t> → states may resist centralized DB sharing.</a:t>
+            </a:r>
+          </a:p>
+          <a:p>
+            <a:endParaRPr lang="en-IN" sz="1400" dirty="0"/>
+          </a:p>
+        </p:txBody>
+      </p:sp>
+      <p:sp>
+        <p:nvSpPr>
+          <p:cNvPr id="5" name="Footer Placeholder 4">
+            <a:extLst>
+              <a:ext uri="{FF2B5EF4-FFF2-40B4-BE49-F238E27FC236}">
+                <a16:creationId xmlns:a16="http://schemas.microsoft.com/office/drawing/2014/main" id="{F2619BA9-3D35-99A0-0A51-A4D22F3CEB60}"/>
+              </a:ext>
+            </a:extLst>
+          </p:cNvPr>
+          <p:cNvSpPr>
+            <a:spLocks noGrp="1"/>
+          </p:cNvSpPr>
+          <p:nvPr>
+            <p:ph type="ftr" sz="quarter" idx="11"/>
+          </p:nvPr>
+        </p:nvSpPr>
+        <p:spPr/>
+        <p:txBody>
+          <a:bodyPr/>
+          <a:lstStyle/>
+          <a:p>
+            <a:pPr>
               <a:defRPr/>
             </a:pPr>
             <a:r>
-              <a:rPr lang="en-US" sz="2800" dirty="0">
+              <a:rPr lang="en-US" dirty="0">
                 <a:solidFill>
-                  <a:prstClr val="black"/>
+                  <a:schemeClr val="bg1"/>
                 </a:solidFill>
-                <a:latin typeface="Arial" pitchFamily="34" charset="0"/>
-                <a:cs typeface="Arial" pitchFamily="34" charset="0"/>
               </a:rPr>
-              <a:t>Analysis of the feasibility of the idea</a:t>
-            </a:r>
-            <a:endParaRPr kumimoji="0" lang="en-US" sz="2800" b="0" i="0" u="none" strike="noStrike" kern="1200" cap="none" spc="0" normalizeH="0" baseline="0" noProof="0" dirty="0">
-              <a:ln>
-                <a:noFill/>
-              </a:ln>
-              <a:solidFill>
-                <a:prstClr val="black"/>
-              </a:solidFill>
-              <a:effectLst/>
-              <a:uLnTx/>
-              <a:uFillTx/>
-              <a:latin typeface="Arial" pitchFamily="34" charset="0"/>
-              <a:ea typeface="ＭＳ Ｐゴシック" pitchFamily="1" charset="-128"/>
-              <a:cs typeface="Arial" pitchFamily="34" charset="0"/>
-            </a:endParaRPr>
-          </a:p>
-          <a:p>
-            <a:pPr marL="342900" marR="0" lvl="0" indent="-342900" algn="just" defTabSz="457200" rtl="0" eaLnBrk="1" fontAlgn="base" latinLnBrk="0" hangingPunct="1">
-              <a:lnSpc>
-                <a:spcPct val="100000"/>
-              </a:lnSpc>
-              <a:spcBef>
-                <a:spcPct val="0"/>
-              </a:spcBef>
-              <a:spcAft>
-                <a:spcPct val="0"/>
-              </a:spcAft>
-              <a:buClrTx/>
-              <a:buSzTx/>
-              <a:buFont typeface="Arial" panose="020B0604020202020204" pitchFamily="34" charset="0"/>
-              <a:buChar char="•"/>
-              <a:tabLst/>
-              <a:defRPr/>
-            </a:pPr>
-            <a:r>
-              <a:rPr lang="en-US" sz="2800" dirty="0">
-                <a:solidFill>
-                  <a:prstClr val="black"/>
-                </a:solidFill>
-                <a:latin typeface="Arial" pitchFamily="34" charset="0"/>
-                <a:cs typeface="Arial" pitchFamily="34" charset="0"/>
-              </a:rPr>
-              <a:t>Potential challenges and risks</a:t>
-            </a:r>
-          </a:p>
-          <a:p>
-            <a:pPr marL="342900" marR="0" lvl="0" indent="-342900" algn="just" defTabSz="457200" rtl="0" eaLnBrk="1" fontAlgn="base" latinLnBrk="0" hangingPunct="1">
-              <a:lnSpc>
-                <a:spcPct val="100000"/>
-              </a:lnSpc>
-              <a:spcBef>
-                <a:spcPct val="0"/>
-              </a:spcBef>
-              <a:spcAft>
-                <a:spcPct val="0"/>
-              </a:spcAft>
-              <a:buClrTx/>
-              <a:buSzTx/>
-              <a:buFont typeface="Arial" panose="020B0604020202020204" pitchFamily="34" charset="0"/>
-              <a:buChar char="•"/>
-              <a:tabLst/>
-              <a:defRPr/>
-            </a:pPr>
-            <a:r>
-              <a:rPr kumimoji="0" lang="en-US" sz="2800" b="0" i="0" u="none" strike="noStrike" kern="1200" cap="none" spc="0" normalizeH="0" baseline="0" noProof="0" dirty="0">
-                <a:ln>
-                  <a:noFill/>
-                </a:ln>
-                <a:solidFill>
-                  <a:prstClr val="black"/>
-                </a:solidFill>
-                <a:effectLst/>
-                <a:uLnTx/>
-                <a:uFillTx/>
-                <a:latin typeface="Arial" pitchFamily="34" charset="0"/>
-                <a:ea typeface="ＭＳ Ｐゴシック" pitchFamily="1" charset="-128"/>
-                <a:cs typeface="Arial" pitchFamily="34" charset="0"/>
-              </a:rPr>
-              <a:t>Strategies</a:t>
-            </a:r>
-            <a:r>
-              <a:rPr kumimoji="0" lang="en-US" sz="2800" b="0" i="0" u="none" strike="noStrike" kern="1200" cap="none" spc="0" normalizeH="0" noProof="0" dirty="0">
-                <a:ln>
-                  <a:noFill/>
-                </a:ln>
-                <a:solidFill>
-                  <a:prstClr val="black"/>
-                </a:solidFill>
-                <a:effectLst/>
-                <a:uLnTx/>
-                <a:uFillTx/>
-                <a:latin typeface="Arial" pitchFamily="34" charset="0"/>
-                <a:ea typeface="ＭＳ Ｐゴシック" pitchFamily="1" charset="-128"/>
-                <a:cs typeface="Arial" pitchFamily="34" charset="0"/>
-              </a:rPr>
-              <a:t> for overcoming these challenges</a:t>
-            </a:r>
-            <a:endParaRPr kumimoji="0" lang="en-US" sz="2800" b="0" i="0" u="none" strike="noStrike" kern="1200" cap="none" spc="0" normalizeH="0" baseline="0" noProof="0" dirty="0">
-              <a:ln>
-                <a:noFill/>
-              </a:ln>
-              <a:solidFill>
-                <a:prstClr val="black"/>
-              </a:solidFill>
-              <a:effectLst/>
-              <a:uLnTx/>
-              <a:uFillTx/>
-              <a:latin typeface="Arial" pitchFamily="34" charset="0"/>
-              <a:ea typeface="ＭＳ Ｐゴシック" pitchFamily="1" charset="-128"/>
-              <a:cs typeface="Arial" pitchFamily="34" charset="0"/>
-            </a:endParaRPr>
-          </a:p>
-        </p:txBody>
-      </p:sp>
-      <p:sp>
-        <p:nvSpPr>
-          <p:cNvPr id="6" name="Slide Number Placeholder 5"/>
+              <a:t>@SIH Idea submission- Template</a:t>
+            </a:r>
+          </a:p>
+        </p:txBody>
+      </p:sp>
+      <p:sp>
+        <p:nvSpPr>
+          <p:cNvPr id="6" name="Slide Number Placeholder 5">
+            <a:extLst>
+              <a:ext uri="{FF2B5EF4-FFF2-40B4-BE49-F238E27FC236}">
+                <a16:creationId xmlns:a16="http://schemas.microsoft.com/office/drawing/2014/main" id="{478A64D1-4F5F-4325-5EA5-B19D8711D1E9}"/>
+              </a:ext>
+            </a:extLst>
+          </p:cNvPr>
           <p:cNvSpPr>
             <a:spLocks noGrp="1"/>
           </p:cNvSpPr>
@@ -7216,155 +7069,31 @@
           <a:bodyPr/>
           <a:lstStyle/>
           <a:p>
-            <a:pPr marL="0" marR="0" lvl="0" indent="0" algn="r" defTabSz="457200" rtl="0" eaLnBrk="1" fontAlgn="base" latinLnBrk="0" hangingPunct="1">
-              <a:lnSpc>
-                <a:spcPct val="100000"/>
-              </a:lnSpc>
-              <a:spcBef>
-                <a:spcPct val="0"/>
-              </a:spcBef>
-              <a:spcAft>
-                <a:spcPct val="0"/>
-              </a:spcAft>
-              <a:buClrTx/>
-              <a:buSzTx/>
-              <a:buFontTx/>
-              <a:buNone/>
-              <a:tabLst/>
-              <a:defRPr/>
-            </a:pPr>
-            <a:fld id="{677C3CE7-23F7-4828-823C-E0205DF2CF97}" type="slidenum">
-              <a:rPr kumimoji="0" lang="en-US" sz="1200" b="1" i="0" u="none" strike="noStrike" kern="1200" cap="none" spc="0" normalizeH="0" baseline="0" noProof="0">
-                <a:ln>
-                  <a:noFill/>
-                </a:ln>
-                <a:solidFill>
-                  <a:prstClr val="white"/>
-                </a:solidFill>
-                <a:effectLst/>
-                <a:uLnTx/>
-                <a:uFillTx/>
-                <a:latin typeface="TradeGothic" pitchFamily="1" charset="0"/>
-                <a:ea typeface="ＭＳ Ｐゴシック" pitchFamily="1" charset="-128"/>
-                <a:cs typeface="+mn-cs"/>
-              </a:rPr>
-              <a:pPr marL="0" marR="0" lvl="0" indent="0" algn="r" defTabSz="457200" rtl="0" eaLnBrk="1" fontAlgn="base" latinLnBrk="0" hangingPunct="1">
-                <a:lnSpc>
-                  <a:spcPct val="100000"/>
-                </a:lnSpc>
-                <a:spcBef>
-                  <a:spcPct val="0"/>
-                </a:spcBef>
-                <a:spcAft>
-                  <a:spcPct val="0"/>
-                </a:spcAft>
-                <a:buClrTx/>
-                <a:buSzTx/>
-                <a:buFontTx/>
-                <a:buNone/>
-                <a:tabLst/>
-                <a:defRPr/>
-              </a:pPr>
+            <a:fld id="{E1FC16D9-1635-4844-816A-0A8A2160FADA}" type="slidenum">
+              <a:rPr lang="en-US" smtClean="0"/>
+              <a:pPr/>
               <a:t>4</a:t>
             </a:fld>
-            <a:endParaRPr kumimoji="0" lang="en-US" sz="1200" b="1" i="0" u="none" strike="noStrike" kern="1200" cap="none" spc="0" normalizeH="0" baseline="0" noProof="0" dirty="0">
-              <a:ln>
-                <a:noFill/>
-              </a:ln>
-              <a:solidFill>
-                <a:prstClr val="white"/>
-              </a:solidFill>
-              <a:effectLst/>
-              <a:uLnTx/>
-              <a:uFillTx/>
-              <a:latin typeface="TradeGothic" pitchFamily="1" charset="0"/>
-              <a:ea typeface="ＭＳ Ｐゴシック" pitchFamily="1" charset="-128"/>
-              <a:cs typeface="+mn-cs"/>
-            </a:endParaRPr>
-          </a:p>
-        </p:txBody>
-      </p:sp>
-      <p:sp>
-        <p:nvSpPr>
-          <p:cNvPr id="7" name="Footer Placeholder 6"/>
-          <p:cNvSpPr>
-            <a:spLocks noGrp="1"/>
-          </p:cNvSpPr>
-          <p:nvPr>
-            <p:ph type="ftr" sz="quarter" idx="11"/>
-          </p:nvPr>
-        </p:nvSpPr>
-        <p:spPr>
-          <a:xfrm>
-            <a:off x="4648200" y="6356353"/>
-            <a:ext cx="3204000" cy="365125"/>
-          </a:xfrm>
-        </p:spPr>
-        <p:txBody>
-          <a:bodyPr/>
-          <a:lstStyle/>
-          <a:p>
-            <a:pPr marL="0" marR="0" lvl="0" indent="0" algn="ctr" defTabSz="457200" rtl="0" eaLnBrk="1" fontAlgn="auto" latinLnBrk="0" hangingPunct="1">
-              <a:lnSpc>
-                <a:spcPct val="100000"/>
-              </a:lnSpc>
-              <a:spcBef>
-                <a:spcPts val="0"/>
-              </a:spcBef>
-              <a:spcAft>
-                <a:spcPts val="0"/>
-              </a:spcAft>
-              <a:buClrTx/>
-              <a:buSzTx/>
-              <a:buFontTx/>
-              <a:buNone/>
-              <a:tabLst/>
-              <a:defRPr/>
-            </a:pPr>
-            <a:r>
-              <a:rPr kumimoji="0" lang="en-US" sz="1200" b="0" i="0" u="none" strike="noStrike" kern="1200" cap="none" spc="0" normalizeH="0" baseline="0" noProof="0">
-                <a:ln>
-                  <a:noFill/>
-                </a:ln>
-                <a:solidFill>
-                  <a:prstClr val="white"/>
-                </a:solidFill>
-                <a:effectLst/>
-                <a:uLnTx/>
-                <a:uFillTx/>
-                <a:latin typeface="TradeGothic"/>
-                <a:ea typeface="+mn-ea"/>
-                <a:cs typeface="+mn-cs"/>
-              </a:rPr>
-              <a:t>@SIH Idea submission- Template</a:t>
-            </a:r>
-            <a:endParaRPr kumimoji="0" lang="en-US" sz="1200" b="0" i="0" u="none" strike="noStrike" kern="1200" cap="none" spc="0" normalizeH="0" baseline="0" noProof="0" dirty="0">
-              <a:ln>
-                <a:noFill/>
-              </a:ln>
-              <a:solidFill>
-                <a:prstClr val="white"/>
-              </a:solidFill>
-              <a:effectLst/>
-              <a:uLnTx/>
-              <a:uFillTx/>
-              <a:latin typeface="TradeGothic"/>
-              <a:ea typeface="+mn-ea"/>
-              <a:cs typeface="+mn-cs"/>
-            </a:endParaRPr>
+            <a:endParaRPr lang="en-US" dirty="0"/>
           </a:p>
         </p:txBody>
       </p:sp>
       <p:pic>
         <p:nvPicPr>
-          <p:cNvPr id="9" name="Picture 2" descr="https://www.sih.gov.in/img1/SIH-Logo.png"/>
+          <p:cNvPr id="10" name="Picture 2" descr="https://www.sih.gov.in/img1/SIH-Logo.png">
+            <a:extLst>
+              <a:ext uri="{FF2B5EF4-FFF2-40B4-BE49-F238E27FC236}">
+                <a16:creationId xmlns:a16="http://schemas.microsoft.com/office/drawing/2014/main" id="{BF6FB0C0-6E4C-7249-4B94-F9A5DB3B92C8}"/>
+              </a:ext>
+            </a:extLst>
+          </p:cNvPr>
           <p:cNvPicPr>
             <a:picLocks noChangeAspect="1" noChangeArrowheads="1"/>
           </p:cNvPicPr>
           <p:nvPr/>
         </p:nvPicPr>
         <p:blipFill>
-          <a:blip r:embed="rId3">
+          <a:blip r:embed="rId2">
             <a:extLst>
               <a:ext uri="{28A0092B-C50C-407E-A947-70E740481C1C}">
                 <a14:useLocalDpi xmlns:a14="http://schemas.microsoft.com/office/drawing/2010/main" val="0"/>
@@ -7398,10 +7127,10 @@
       </p:pic>
       <p:sp>
         <p:nvSpPr>
-          <p:cNvPr id="2" name="Oval 1" descr="Your startup LOGO">
+          <p:cNvPr id="11" name="Oval 10" descr="Your startup LOGO">
             <a:extLst>
               <a:ext uri="{FF2B5EF4-FFF2-40B4-BE49-F238E27FC236}">
-                <a16:creationId xmlns:a16="http://schemas.microsoft.com/office/drawing/2014/main" id="{C60938AD-C08F-ED65-E9B1-E87A6A6970E5}"/>
+                <a16:creationId xmlns:a16="http://schemas.microsoft.com/office/drawing/2014/main" id="{449FCDB1-0636-278B-2BB7-E67E9BBDA77D}"/>
               </a:ext>
               <a:ext uri="{C183D7F6-B498-43B3-948B-1728B52AA6E4}">
                 <adec:decorative xmlns:adec="http://schemas.microsoft.com/office/drawing/2017/decorative" val="0"/>
@@ -7447,10 +7176,94 @@
           </a:p>
         </p:txBody>
       </p:sp>
+      <p:sp>
+        <p:nvSpPr>
+          <p:cNvPr id="13" name="Content Placeholder 12">
+            <a:extLst>
+              <a:ext uri="{FF2B5EF4-FFF2-40B4-BE49-F238E27FC236}">
+                <a16:creationId xmlns:a16="http://schemas.microsoft.com/office/drawing/2014/main" id="{42DB607F-EAA8-5923-25DF-56239A0ED4D1}"/>
+              </a:ext>
+            </a:extLst>
+          </p:cNvPr>
+          <p:cNvSpPr>
+            <a:spLocks noGrp="1"/>
+          </p:cNvSpPr>
+          <p:nvPr>
+            <p:ph sz="half" idx="2"/>
+          </p:nvPr>
+        </p:nvSpPr>
+        <p:spPr/>
+        <p:txBody>
+          <a:bodyPr/>
+          <a:lstStyle/>
+          <a:p>
+            <a:pPr marL="0" indent="0">
+              <a:buNone/>
+            </a:pPr>
+            <a:r>
+              <a:rPr lang="en-IN" sz="1800" b="1" dirty="0"/>
+              <a:t>Strategies to Overcome</a:t>
+            </a:r>
+          </a:p>
+          <a:p>
+            <a:r>
+              <a:rPr lang="en-IN" sz="1800" b="1" dirty="0"/>
+              <a:t>Priority-based alert scoring</a:t>
+            </a:r>
+            <a:r>
+              <a:rPr lang="en-IN" sz="1800" dirty="0"/>
+              <a:t> → AI filters real threats vs false alarms.</a:t>
+            </a:r>
+          </a:p>
+          <a:p>
+            <a:r>
+              <a:rPr lang="en-IN" sz="1800" b="1" dirty="0"/>
+              <a:t>End-to-end encryption + Blockchain</a:t>
+            </a:r>
+            <a:r>
+              <a:rPr lang="en-IN" sz="1800" dirty="0"/>
+              <a:t> → ensures data security &amp; tamper-proof records.</a:t>
+            </a:r>
+          </a:p>
+          <a:p>
+            <a:r>
+              <a:rPr lang="en-IN" sz="1800" b="1" dirty="0"/>
+              <a:t>Tourist education</a:t>
+            </a:r>
+            <a:r>
+              <a:rPr lang="en-IN" sz="1800" dirty="0"/>
+              <a:t> → multilingual, clear alerts with explanations.</a:t>
+            </a:r>
+          </a:p>
+          <a:p>
+            <a:r>
+              <a:rPr lang="en-IN" sz="1800" b="1" dirty="0"/>
+              <a:t>IoT/offline support</a:t>
+            </a:r>
+            <a:r>
+              <a:rPr lang="en-IN" sz="1800" dirty="0"/>
+              <a:t> → cached GPS or smart bands in no-network areas.</a:t>
+            </a:r>
+          </a:p>
+          <a:p>
+            <a:r>
+              <a:rPr lang="en-IN" sz="1800" b="1" dirty="0"/>
+              <a:t>Federated blockchain model</a:t>
+            </a:r>
+            <a:r>
+              <a:rPr lang="en-IN" sz="1800" dirty="0"/>
+              <a:t> → each state controls its own data node.</a:t>
+            </a:r>
+          </a:p>
+          <a:p>
+            <a:endParaRPr lang="en-IN" sz="1800" dirty="0"/>
+          </a:p>
+        </p:txBody>
+      </p:sp>
     </p:spTree>
     <p:extLst>
       <p:ext uri="{BB962C8B-B14F-4D97-AF65-F5344CB8AC3E}">
-        <p14:creationId xmlns:p14="http://schemas.microsoft.com/office/powerpoint/2010/main" val="3753387913"/>
+        <p14:creationId xmlns:p14="http://schemas.microsoft.com/office/powerpoint/2010/main" val="3060722717"/>
       </p:ext>
     </p:extLst>
   </p:cSld>
@@ -7593,8 +7406,8 @@
         </p:nvSpPr>
         <p:spPr bwMode="auto">
           <a:xfrm>
-            <a:off x="609600" y="2533653"/>
-            <a:ext cx="9385300" cy="1384995"/>
+            <a:off x="774699" y="1557926"/>
+            <a:ext cx="10453739" cy="4585871"/>
           </a:xfrm>
           <a:prstGeom prst="rect">
             <a:avLst/>
@@ -7613,7 +7426,123 @@
           </a:bodyPr>
           <a:lstStyle/>
           <a:p>
-            <a:pPr marL="342900" marR="0" lvl="0" indent="-342900" algn="just" defTabSz="457200" rtl="0" eaLnBrk="1" fontAlgn="base" latinLnBrk="0" hangingPunct="1">
+            <a:r>
+              <a:rPr lang="en-US" sz="2000" b="1" dirty="0"/>
+              <a:t>Potential Impact on Target Audience :</a:t>
+            </a:r>
+          </a:p>
+          <a:p>
+            <a:pPr marL="285750" indent="-285750">
+              <a:buFont typeface="Arial" panose="020B0604020202020204" pitchFamily="34" charset="0"/>
+              <a:buChar char="•"/>
+            </a:pPr>
+            <a:r>
+              <a:rPr lang="en-US" b="1" dirty="0"/>
+              <a:t>Tourists</a:t>
+            </a:r>
+            <a:r>
+              <a:rPr lang="en-US" dirty="0"/>
+              <a:t> → Safer travel experience with real-time alerts &amp; SOS support.</a:t>
+            </a:r>
+          </a:p>
+          <a:p>
+            <a:pPr marL="285750" indent="-285750">
+              <a:buFont typeface="Arial" panose="020B0604020202020204" pitchFamily="34" charset="0"/>
+              <a:buChar char="•"/>
+            </a:pPr>
+            <a:r>
+              <a:rPr lang="en-US" b="1" dirty="0"/>
+              <a:t>Police &amp; Authorities</a:t>
+            </a:r>
+            <a:r>
+              <a:rPr lang="en-US" dirty="0"/>
+              <a:t> → Faster incident response, efficient resource allocation.</a:t>
+            </a:r>
+          </a:p>
+          <a:p>
+            <a:pPr marL="285750" indent="-285750">
+              <a:buFont typeface="Arial" panose="020B0604020202020204" pitchFamily="34" charset="0"/>
+              <a:buChar char="•"/>
+            </a:pPr>
+            <a:r>
+              <a:rPr lang="en-US" b="1" dirty="0"/>
+              <a:t>Tourism Departments</a:t>
+            </a:r>
+            <a:r>
+              <a:rPr lang="en-US" dirty="0"/>
+              <a:t> → Improved monitoring of tourist clusters &amp; high-risk zones.</a:t>
+            </a:r>
+          </a:p>
+          <a:p>
+            <a:br>
+              <a:rPr lang="en-US" dirty="0"/>
+            </a:br>
+            <a:endParaRPr lang="en-US" dirty="0"/>
+          </a:p>
+          <a:p>
+            <a:r>
+              <a:rPr lang="en-US" sz="2000" b="1" dirty="0"/>
+              <a:t>Benefits of the Solution :</a:t>
+            </a:r>
+          </a:p>
+          <a:p>
+            <a:pPr marL="285750" indent="-285750">
+              <a:buFont typeface="Arial" panose="020B0604020202020204" pitchFamily="34" charset="0"/>
+              <a:buChar char="•"/>
+            </a:pPr>
+            <a:r>
+              <a:rPr lang="en-US" b="1" dirty="0"/>
+              <a:t>Social</a:t>
+            </a:r>
+            <a:r>
+              <a:rPr lang="en-US" dirty="0"/>
+              <a:t> → Increases trust in law enforcement, improves tourist confidence, ensures inclusivity with multilingual support.</a:t>
+            </a:r>
+          </a:p>
+          <a:p>
+            <a:pPr marL="285750" indent="-285750">
+              <a:buFont typeface="Arial" panose="020B0604020202020204" pitchFamily="34" charset="0"/>
+              <a:buChar char="•"/>
+            </a:pPr>
+            <a:r>
+              <a:rPr lang="en-US" b="1" dirty="0"/>
+              <a:t>Economic</a:t>
+            </a:r>
+            <a:r>
+              <a:rPr lang="en-US" dirty="0"/>
+              <a:t> → Boosts tourism revenue by improving India’s global safety image, reduces losses from frauds &amp; crimes.</a:t>
+            </a:r>
+          </a:p>
+          <a:p>
+            <a:pPr marL="285750" indent="-285750">
+              <a:buFont typeface="Arial" panose="020B0604020202020204" pitchFamily="34" charset="0"/>
+              <a:buChar char="•"/>
+            </a:pPr>
+            <a:r>
+              <a:rPr lang="en-US" b="1" dirty="0"/>
+              <a:t>Operational</a:t>
+            </a:r>
+            <a:r>
+              <a:rPr lang="en-US" dirty="0"/>
+              <a:t> → Automates incident reporting (E-FIR), reduces manual effort, enables data-driven decision making.</a:t>
+            </a:r>
+          </a:p>
+          <a:p>
+            <a:pPr marL="285750" indent="-285750">
+              <a:buFont typeface="Arial" panose="020B0604020202020204" pitchFamily="34" charset="0"/>
+              <a:buChar char="•"/>
+            </a:pPr>
+            <a:r>
+              <a:rPr lang="en-US" b="1" dirty="0"/>
+              <a:t>Environmental (Indirect)</a:t>
+            </a:r>
+            <a:r>
+              <a:rPr lang="en-US" dirty="0"/>
+              <a:t> → Encourages safe eco-tourism with monitoring in forests, caves, and remote zones.</a:t>
+            </a:r>
+          </a:p>
+          <a:p>
+            <a:pPr marR="0" lvl="0" algn="just" defTabSz="457200" rtl="0" eaLnBrk="1" fontAlgn="base" latinLnBrk="0" hangingPunct="1">
               <a:lnSpc>
                 <a:spcPct val="100000"/>
               </a:lnSpc>
@@ -7625,57 +7554,16 @@
               </a:spcAft>
               <a:buClrTx/>
               <a:buSzTx/>
-              <a:buFont typeface="Arial" panose="020B0604020202020204" pitchFamily="34" charset="0"/>
-              <a:buChar char="•"/>
               <a:tabLst/>
               <a:defRPr/>
             </a:pPr>
-            <a:r>
-              <a:rPr kumimoji="0" lang="en-US" sz="2800" b="0" i="0" u="none" strike="noStrike" kern="1200" cap="none" spc="0" normalizeH="0" baseline="0" noProof="0" dirty="0">
-                <a:ln>
-                  <a:noFill/>
-                </a:ln>
-                <a:solidFill>
-                  <a:prstClr val="black"/>
-                </a:solidFill>
-                <a:effectLst/>
-                <a:uLnTx/>
-                <a:uFillTx/>
-                <a:latin typeface="Arial" pitchFamily="34" charset="0"/>
-                <a:ea typeface="ＭＳ Ｐゴシック" pitchFamily="1" charset="-128"/>
-                <a:cs typeface="Arial" pitchFamily="34" charset="0"/>
-              </a:rPr>
-              <a:t>Potential impact on the target audience</a:t>
-            </a:r>
-          </a:p>
-          <a:p>
-            <a:pPr marL="342900" marR="0" lvl="0" indent="-342900" algn="just" defTabSz="457200" rtl="0" eaLnBrk="1" fontAlgn="base" latinLnBrk="0" hangingPunct="1">
-              <a:lnSpc>
-                <a:spcPct val="100000"/>
-              </a:lnSpc>
-              <a:spcBef>
-                <a:spcPct val="0"/>
-              </a:spcBef>
-              <a:spcAft>
-                <a:spcPct val="0"/>
-              </a:spcAft>
-              <a:buClrTx/>
-              <a:buSzTx/>
-              <a:buFont typeface="Arial" panose="020B0604020202020204" pitchFamily="34" charset="0"/>
-              <a:buChar char="•"/>
-              <a:tabLst/>
-              <a:defRPr/>
-            </a:pPr>
-            <a:r>
-              <a:rPr lang="en-US" sz="2800" dirty="0">
-                <a:solidFill>
-                  <a:prstClr val="black"/>
-                </a:solidFill>
-                <a:latin typeface="Arial" pitchFamily="34" charset="0"/>
-                <a:cs typeface="Arial" pitchFamily="34" charset="0"/>
-              </a:rPr>
-              <a:t>Benefits of the solution (social, economic, environmental, etc.)</a:t>
-            </a:r>
+            <a:endParaRPr lang="en-US" dirty="0">
+              <a:solidFill>
+                <a:prstClr val="black"/>
+              </a:solidFill>
+              <a:latin typeface="Arial" pitchFamily="34" charset="0"/>
+              <a:cs typeface="Arial" pitchFamily="34" charset="0"/>
+            </a:endParaRPr>
           </a:p>
         </p:txBody>
       </p:sp>
@@ -8071,8 +7959,8 @@
         </p:nvSpPr>
         <p:spPr bwMode="auto">
           <a:xfrm>
-            <a:off x="609600" y="2795263"/>
-            <a:ext cx="9385300" cy="523220"/>
+            <a:off x="1170039" y="1551563"/>
+            <a:ext cx="9385300" cy="4031873"/>
           </a:xfrm>
           <a:prstGeom prst="rect">
             <a:avLst/>
@@ -8091,47 +7979,147 @@
           </a:bodyPr>
           <a:lstStyle/>
           <a:p>
-            <a:pPr marL="342900" marR="0" lvl="0" indent="-342900" algn="just" defTabSz="457200" rtl="0" eaLnBrk="1" fontAlgn="base" latinLnBrk="0" hangingPunct="1">
-              <a:lnSpc>
-                <a:spcPct val="100000"/>
-              </a:lnSpc>
-              <a:spcBef>
-                <a:spcPct val="0"/>
-              </a:spcBef>
-              <a:spcAft>
-                <a:spcPct val="0"/>
-              </a:spcAft>
-              <a:buClrTx/>
-              <a:buSzTx/>
+            <a:r>
+              <a:rPr lang="en-IN" sz="2000" b="1" dirty="0"/>
+              <a:t>Datasets</a:t>
+            </a:r>
+          </a:p>
+          <a:p>
+            <a:pPr marL="285750" indent="-285750">
               <a:buFont typeface="Arial" panose="020B0604020202020204" pitchFamily="34" charset="0"/>
               <a:buChar char="•"/>
-              <a:tabLst/>
-              <a:defRPr/>
             </a:pPr>
             <a:r>
-              <a:rPr lang="en-US" sz="2800" noProof="0" dirty="0">
-                <a:solidFill>
-                  <a:prstClr val="black"/>
-                </a:solidFill>
-                <a:latin typeface="Arial" pitchFamily="34" charset="0"/>
-                <a:cs typeface="Arial" pitchFamily="34" charset="0"/>
+              <a:rPr lang="en-IN" b="1" dirty="0"/>
+              <a:t>Crime in India – Kaggle Dataset</a:t>
+            </a:r>
+            <a:br>
+              <a:rPr lang="en-IN" dirty="0"/>
+            </a:br>
+            <a:r>
+              <a:rPr lang="en-IN" dirty="0">
+                <a:hlinkClick r:id="rId3"/>
               </a:rPr>
-              <a:t>Details / Links of the reference and research work</a:t>
-            </a:r>
-            <a:endParaRPr kumimoji="0" lang="en-US" sz="2800" b="0" i="0" u="none" strike="noStrike" kern="1200" cap="none" spc="0" normalizeH="0" baseline="0" noProof="0" dirty="0">
-              <a:ln>
-                <a:noFill/>
-              </a:ln>
-              <a:solidFill>
-                <a:prstClr val="black"/>
-              </a:solidFill>
-              <a:effectLst/>
-              <a:uLnTx/>
-              <a:uFillTx/>
-              <a:latin typeface="Arial" pitchFamily="34" charset="0"/>
-              <a:ea typeface="ＭＳ Ｐゴシック" pitchFamily="1" charset="-128"/>
-              <a:cs typeface="Arial" pitchFamily="34" charset="0"/>
-            </a:endParaRPr>
+              <a:t>https://www.kaggle.com/datasets/rajanand/crime-in-india</a:t>
+            </a:r>
+            <a:endParaRPr lang="en-IN" dirty="0"/>
+          </a:p>
+          <a:p>
+            <a:pPr marL="285750" indent="-285750">
+              <a:buFont typeface="Arial" panose="020B0604020202020204" pitchFamily="34" charset="0"/>
+              <a:buChar char="•"/>
+            </a:pPr>
+            <a:r>
+              <a:rPr lang="en-IN" b="1" dirty="0"/>
+              <a:t>Microsoft </a:t>
+            </a:r>
+            <a:r>
+              <a:rPr lang="en-IN" b="1" dirty="0" err="1"/>
+              <a:t>Geolife</a:t>
+            </a:r>
+            <a:r>
+              <a:rPr lang="en-IN" b="1" dirty="0"/>
+              <a:t> GPS Trajectory Dataset</a:t>
+            </a:r>
+            <a:br>
+              <a:rPr lang="en-IN" dirty="0"/>
+            </a:br>
+            <a:r>
+              <a:rPr lang="en-IN" dirty="0">
+                <a:hlinkClick r:id="rId4"/>
+              </a:rPr>
+              <a:t>https://www.kaggle.com/datasets/arashnic/microsoft-geolife-gps-trajectory-dataset</a:t>
+            </a:r>
+            <a:endParaRPr lang="en-IN" dirty="0"/>
+          </a:p>
+          <a:p>
+            <a:pPr marL="285750" indent="-285750">
+              <a:buFont typeface="Arial" panose="020B0604020202020204" pitchFamily="34" charset="0"/>
+              <a:buChar char="•"/>
+            </a:pPr>
+            <a:r>
+              <a:rPr lang="en-IN" b="1" dirty="0" err="1"/>
+              <a:t>Safetipin</a:t>
+            </a:r>
+            <a:r>
+              <a:rPr lang="en-IN" b="1" dirty="0"/>
+              <a:t> Open Data – Women Safety Scores</a:t>
+            </a:r>
+            <a:br>
+              <a:rPr lang="en-IN" dirty="0"/>
+            </a:br>
+            <a:r>
+              <a:rPr lang="en-IN" dirty="0"/>
+              <a:t>https://safetipin.com/open-data/</a:t>
+            </a:r>
+          </a:p>
+          <a:p>
+            <a:pPr marL="285750" indent="-285750">
+              <a:buFont typeface="Arial" panose="020B0604020202020204" pitchFamily="34" charset="0"/>
+              <a:buChar char="•"/>
+            </a:pPr>
+            <a:r>
+              <a:rPr lang="en-IN" b="1" dirty="0" err="1"/>
+              <a:t>AnLoCOV</a:t>
+            </a:r>
+            <a:r>
+              <a:rPr lang="en-IN" b="1" dirty="0"/>
+              <a:t>: An anonymised longitudinal GPS dataset (Pre &amp; Post-COVID mobility patterns)</a:t>
+            </a:r>
+            <a:br>
+              <a:rPr lang="en-IN" dirty="0"/>
+            </a:br>
+            <a:r>
+              <a:rPr lang="en-IN" dirty="0"/>
+              <a:t>https://doi.org/10.1016/j.dib.2022.108776</a:t>
+            </a:r>
+          </a:p>
+          <a:p>
+            <a:r>
+              <a:rPr lang="en-IN" b="1"/>
+              <a:t> </a:t>
+            </a:r>
+          </a:p>
+          <a:p>
+            <a:r>
+              <a:rPr lang="en-IN" sz="2000" b="1"/>
+              <a:t>Related </a:t>
+            </a:r>
+            <a:r>
+              <a:rPr lang="en-IN" sz="2000" b="1" dirty="0"/>
+              <a:t>Research / Articles</a:t>
+            </a:r>
+            <a:endParaRPr lang="en-IN" b="1" dirty="0"/>
+          </a:p>
+          <a:p>
+            <a:pPr marL="285750" indent="-285750">
+              <a:buFont typeface="Arial" panose="020B0604020202020204" pitchFamily="34" charset="0"/>
+              <a:buChar char="•"/>
+            </a:pPr>
+            <a:r>
+              <a:rPr lang="en-IN" dirty="0"/>
+              <a:t>“AI for Crime Prediction and Anomaly Detection” – IEEE Xplore.</a:t>
+            </a:r>
+          </a:p>
+          <a:p>
+            <a:pPr marL="285750" indent="-285750">
+              <a:buFont typeface="Arial" panose="020B0604020202020204" pitchFamily="34" charset="0"/>
+              <a:buChar char="•"/>
+            </a:pPr>
+            <a:r>
+              <a:rPr lang="en-IN" dirty="0"/>
+              <a:t>“Blockchain in Digital Identity Management” – Springer.</a:t>
+            </a:r>
+          </a:p>
+          <a:p>
+            <a:pPr marL="285750" indent="-285750">
+              <a:buFont typeface="Arial" panose="020B0604020202020204" pitchFamily="34" charset="0"/>
+              <a:buChar char="•"/>
+            </a:pPr>
+            <a:r>
+              <a:rPr lang="en-IN" dirty="0"/>
+              <a:t>“Tourist Safety and Risk Perception in India” – Journal of Tourism Studies.</a:t>
+            </a:r>
           </a:p>
         </p:txBody>
       </p:sp>
@@ -8298,7 +8286,7 @@
           <p:nvPr/>
         </p:nvPicPr>
         <p:blipFill>
-          <a:blip r:embed="rId3">
+          <a:blip r:embed="rId5">
             <a:extLst>
               <a:ext uri="{28A0092B-C50C-407E-A947-70E740481C1C}">
                 <a14:useLocalDpi xmlns:a14="http://schemas.microsoft.com/office/drawing/2010/main" val="0"/>

</xml_diff>

<commit_message>
Updated sih with github repo link
</commit_message>
<xml_diff>
--- a/sih.pptx
+++ b/sih.pptx
@@ -5,7 +5,7 @@
     <p:sldMasterId id="2147483648" r:id="rId1"/>
   </p:sldMasterIdLst>
   <p:notesMasterIdLst>
-    <p:notesMasterId r:id="rId9"/>
+    <p:notesMasterId r:id="rId8"/>
   </p:notesMasterIdLst>
   <p:sldIdLst>
     <p:sldId id="291" r:id="rId2"/>
@@ -14,7 +14,6 @@
     <p:sldId id="298" r:id="rId5"/>
     <p:sldId id="294" r:id="rId6"/>
     <p:sldId id="296" r:id="rId7"/>
-    <p:sldId id="297" r:id="rId8"/>
   </p:sldIdLst>
   <p:sldSz cx="12192000" cy="6858000"/>
   <p:notesSz cx="6858000" cy="9144000"/>
@@ -1165,184 +1164,6 @@
     <p:extLst>
       <p:ext uri="{BB962C8B-B14F-4D97-AF65-F5344CB8AC3E}">
         <p14:creationId xmlns:p14="http://schemas.microsoft.com/office/powerpoint/2010/main" val="1908672725"/>
-      </p:ext>
-    </p:extLst>
-  </p:cSld>
-  <p:clrMapOvr>
-    <a:masterClrMapping/>
-  </p:clrMapOvr>
-</p:notes>
-</file>
-
-<file path=ppt/notesSlides/notesSlide5.xml><?xml version="1.0" encoding="utf-8"?>
-<p:notes xmlns:a="http://schemas.openxmlformats.org/drawingml/2006/main" xmlns:r="http://schemas.openxmlformats.org/officeDocument/2006/relationships" xmlns:p="http://schemas.openxmlformats.org/presentationml/2006/main">
-  <p:cSld>
-    <p:spTree>
-      <p:nvGrpSpPr>
-        <p:cNvPr id="1" name=""/>
-        <p:cNvGrpSpPr/>
-        <p:nvPr/>
-      </p:nvGrpSpPr>
-      <p:grpSpPr>
-        <a:xfrm>
-          <a:off x="0" y="0"/>
-          <a:ext cx="0" cy="0"/>
-          <a:chOff x="0" y="0"/>
-          <a:chExt cx="0" cy="0"/>
-        </a:xfrm>
-      </p:grpSpPr>
-      <p:sp>
-        <p:nvSpPr>
-          <p:cNvPr id="18433" name="Slide Image Placeholder 1"/>
-          <p:cNvSpPr>
-            <a:spLocks noGrp="1" noRot="1" noChangeAspect="1"/>
-          </p:cNvSpPr>
-          <p:nvPr>
-            <p:ph type="sldImg"/>
-          </p:nvPr>
-        </p:nvSpPr>
-        <p:spPr bwMode="auto">
-          <a:xfrm>
-            <a:off x="381000" y="685800"/>
-            <a:ext cx="6096000" cy="3429000"/>
-          </a:xfrm>
-          <a:noFill/>
-          <a:ln>
-            <a:solidFill>
-              <a:srgbClr val="000000"/>
-            </a:solidFill>
-            <a:miter lim="800000"/>
-            <a:headEnd/>
-            <a:tailEnd/>
-          </a:ln>
-        </p:spPr>
-      </p:sp>
-      <p:sp>
-        <p:nvSpPr>
-          <p:cNvPr id="18434" name="Notes Placeholder 2"/>
-          <p:cNvSpPr>
-            <a:spLocks noGrp="1"/>
-          </p:cNvSpPr>
-          <p:nvPr>
-            <p:ph type="body" idx="1"/>
-          </p:nvPr>
-        </p:nvSpPr>
-        <p:spPr bwMode="auto">
-          <a:noFill/>
-        </p:spPr>
-        <p:txBody>
-          <a:bodyPr wrap="square" numCol="1" anchor="t" anchorCtr="0" compatLnSpc="1">
-            <a:prstTxWarp prst="textNoShape">
-              <a:avLst/>
-            </a:prstTxWarp>
-          </a:bodyPr>
-          <a:lstStyle/>
-          <a:p>
-            <a:pPr eaLnBrk="1" hangingPunct="1">
-              <a:spcBef>
-                <a:spcPct val="0"/>
-              </a:spcBef>
-            </a:pPr>
-            <a:endParaRPr lang="en-US">
-              <a:ea typeface="ＭＳ Ｐゴシック" pitchFamily="1" charset="-128"/>
-            </a:endParaRPr>
-          </a:p>
-        </p:txBody>
-      </p:sp>
-      <p:sp>
-        <p:nvSpPr>
-          <p:cNvPr id="18435" name="Slide Number Placeholder 3"/>
-          <p:cNvSpPr>
-            <a:spLocks noGrp="1"/>
-          </p:cNvSpPr>
-          <p:nvPr>
-            <p:ph type="sldNum" sz="quarter" idx="5"/>
-          </p:nvPr>
-        </p:nvSpPr>
-        <p:spPr bwMode="auto">
-          <a:noFill/>
-          <a:ln>
-            <a:miter lim="800000"/>
-            <a:headEnd/>
-            <a:tailEnd/>
-          </a:ln>
-        </p:spPr>
-        <p:txBody>
-          <a:bodyPr/>
-          <a:lstStyle/>
-          <a:p>
-            <a:pPr marL="0" marR="0" lvl="0" indent="0" algn="r" defTabSz="457200" rtl="0" eaLnBrk="1" fontAlgn="base" latinLnBrk="0" hangingPunct="1">
-              <a:lnSpc>
-                <a:spcPct val="100000"/>
-              </a:lnSpc>
-              <a:spcBef>
-                <a:spcPct val="0"/>
-              </a:spcBef>
-              <a:spcAft>
-                <a:spcPct val="0"/>
-              </a:spcAft>
-              <a:buClrTx/>
-              <a:buSzTx/>
-              <a:buFontTx/>
-              <a:buNone/>
-              <a:tabLst/>
-              <a:defRPr/>
-            </a:pPr>
-            <a:fld id="{0CA7B74D-3791-4AC6-8451-F10DBCCCDD9A}" type="slidenum">
-              <a:rPr kumimoji="0" lang="en-US" sz="1200" b="0" i="0" u="none" strike="noStrike" kern="1200" cap="none" spc="0" normalizeH="0" baseline="0" noProof="0">
-                <a:ln>
-                  <a:noFill/>
-                </a:ln>
-                <a:solidFill>
-                  <a:prstClr val="black"/>
-                </a:solidFill>
-                <a:effectLst/>
-                <a:uLnTx/>
-                <a:uFillTx/>
-                <a:latin typeface="Calibri" pitchFamily="34" charset="0"/>
-                <a:ea typeface="ＭＳ Ｐゴシック" pitchFamily="1" charset="-128"/>
-                <a:cs typeface="+mn-cs"/>
-              </a:rPr>
-              <a:pPr marL="0" marR="0" lvl="0" indent="0" algn="r" defTabSz="457200" rtl="0" eaLnBrk="1" fontAlgn="base" latinLnBrk="0" hangingPunct="1">
-                <a:lnSpc>
-                  <a:spcPct val="100000"/>
-                </a:lnSpc>
-                <a:spcBef>
-                  <a:spcPct val="0"/>
-                </a:spcBef>
-                <a:spcAft>
-                  <a:spcPct val="0"/>
-                </a:spcAft>
-                <a:buClrTx/>
-                <a:buSzTx/>
-                <a:buFontTx/>
-                <a:buNone/>
-                <a:tabLst/>
-                <a:defRPr/>
-              </a:pPr>
-              <a:t>7</a:t>
-            </a:fld>
-            <a:endParaRPr kumimoji="0" lang="en-US" sz="1200" b="0" i="0" u="none" strike="noStrike" kern="1200" cap="none" spc="0" normalizeH="0" baseline="0" noProof="0">
-              <a:ln>
-                <a:noFill/>
-              </a:ln>
-              <a:solidFill>
-                <a:prstClr val="black"/>
-              </a:solidFill>
-              <a:effectLst/>
-              <a:uLnTx/>
-              <a:uFillTx/>
-              <a:latin typeface="Calibri" pitchFamily="34" charset="0"/>
-              <a:ea typeface="ＭＳ Ｐゴシック" pitchFamily="1" charset="-128"/>
-              <a:cs typeface="+mn-cs"/>
-            </a:endParaRPr>
-          </a:p>
-        </p:txBody>
-      </p:sp>
-    </p:spTree>
-    <p:extLst>
-      <p:ext uri="{BB962C8B-B14F-4D97-AF65-F5344CB8AC3E}">
-        <p14:creationId xmlns:p14="http://schemas.microsoft.com/office/powerpoint/2010/main" val="3783576877"/>
       </p:ext>
     </p:extLst>
   </p:cSld>
@@ -5576,7 +5397,7 @@
         <p:spPr>
           <a:xfrm>
             <a:off x="283384" y="1071303"/>
-            <a:ext cx="6663513" cy="4715393"/>
+            <a:ext cx="6663513" cy="5269391"/>
           </a:xfrm>
           <a:prstGeom prst="rect">
             <a:avLst/>
@@ -5700,6 +5521,56 @@
                 <a:cs typeface="Arial" panose="020B0604020202020204" pitchFamily="34" charset="0"/>
               </a:rPr>
               <a:t>Team Name (Registered on portal) – Algorithm Avengers</a:t>
+            </a:r>
+          </a:p>
+          <a:p>
+            <a:pPr algn="just">
+              <a:lnSpc>
+                <a:spcPct val="200000"/>
+              </a:lnSpc>
+            </a:pPr>
+            <a:r>
+              <a:rPr lang="en-US" b="1" dirty="0">
+                <a:latin typeface="Arial" panose="020B0604020202020204" pitchFamily="34" charset="0"/>
+                <a:cs typeface="Arial" panose="020B0604020202020204" pitchFamily="34" charset="0"/>
+              </a:rPr>
+              <a:t>[</a:t>
+            </a:r>
+            <a:r>
+              <a:rPr lang="en-US" b="1" dirty="0" err="1">
+                <a:latin typeface="Arial" panose="020B0604020202020204" pitchFamily="34" charset="0"/>
+                <a:cs typeface="Arial" panose="020B0604020202020204" pitchFamily="34" charset="0"/>
+              </a:rPr>
+              <a:t>DemoLink</a:t>
+            </a:r>
+            <a:r>
+              <a:rPr lang="en-US" b="1" dirty="0">
+                <a:latin typeface="Arial" panose="020B0604020202020204" pitchFamily="34" charset="0"/>
+                <a:cs typeface="Arial" panose="020B0604020202020204" pitchFamily="34" charset="0"/>
+              </a:rPr>
+              <a:t> : </a:t>
+            </a:r>
+            <a:r>
+              <a:rPr lang="en-US" sz="1400" dirty="0">
+                <a:latin typeface="Arial" panose="020B0604020202020204" pitchFamily="34" charset="0"/>
+                <a:cs typeface="Arial" panose="020B0604020202020204" pitchFamily="34" charset="0"/>
+                <a:hlinkClick r:id="rId3"/>
+              </a:rPr>
+              <a:t>https://github.com/Rohit-Solanki-6105/doc-sih-25002</a:t>
+            </a:r>
+            <a:r>
+              <a:rPr lang="en-US" sz="1400" dirty="0">
+                <a:latin typeface="Arial" panose="020B0604020202020204" pitchFamily="34" charset="0"/>
+                <a:cs typeface="Arial" panose="020B0604020202020204" pitchFamily="34" charset="0"/>
+              </a:rPr>
+              <a:t> </a:t>
+            </a:r>
+            <a:r>
+              <a:rPr lang="en-US" b="1" dirty="0">
+                <a:latin typeface="Arial" panose="020B0604020202020204" pitchFamily="34" charset="0"/>
+                <a:cs typeface="Arial" panose="020B0604020202020204" pitchFamily="34" charset="0"/>
+              </a:rPr>
+              <a:t>]</a:t>
             </a:r>
             <a:endParaRPr lang="en-IN" b="1" dirty="0">
               <a:latin typeface="Arial" panose="020B0604020202020204" pitchFamily="34" charset="0"/>
@@ -5717,7 +5588,7 @@
           <p:nvPr/>
         </p:nvPicPr>
         <p:blipFill>
-          <a:blip r:embed="rId3">
+          <a:blip r:embed="rId4">
             <a:extLst>
               <a:ext uri="{28A0092B-C50C-407E-A947-70E740481C1C}">
                 <a14:useLocalDpi xmlns:a14="http://schemas.microsoft.com/office/drawing/2010/main" val="0"/>
@@ -7201,62 +7072,62 @@
               <a:buNone/>
             </a:pPr>
             <a:r>
-              <a:rPr lang="en-IN" sz="1800" b="1" dirty="0"/>
+              <a:rPr lang="en-IN" sz="1600" b="1" dirty="0"/>
               <a:t>Strategies to Overcome</a:t>
             </a:r>
           </a:p>
           <a:p>
             <a:r>
-              <a:rPr lang="en-IN" sz="1800" b="1" dirty="0"/>
+              <a:rPr lang="en-IN" sz="1600" b="1" dirty="0"/>
               <a:t>Priority-based alert scoring</a:t>
             </a:r>
             <a:r>
-              <a:rPr lang="en-IN" sz="1800" dirty="0"/>
+              <a:rPr lang="en-IN" sz="1600" dirty="0"/>
               <a:t> → AI filters real threats vs false alarms.</a:t>
             </a:r>
           </a:p>
           <a:p>
             <a:r>
-              <a:rPr lang="en-IN" sz="1800" b="1" dirty="0"/>
+              <a:rPr lang="en-IN" sz="1600" b="1" dirty="0"/>
               <a:t>End-to-end encryption + Blockchain</a:t>
             </a:r>
             <a:r>
-              <a:rPr lang="en-IN" sz="1800" dirty="0"/>
+              <a:rPr lang="en-IN" sz="1600" dirty="0"/>
               <a:t> → ensures data security &amp; tamper-proof records.</a:t>
             </a:r>
           </a:p>
           <a:p>
             <a:r>
-              <a:rPr lang="en-IN" sz="1800" b="1" dirty="0"/>
+              <a:rPr lang="en-IN" sz="1600" b="1" dirty="0"/>
               <a:t>Tourist education</a:t>
             </a:r>
             <a:r>
-              <a:rPr lang="en-IN" sz="1800" dirty="0"/>
+              <a:rPr lang="en-IN" sz="1600" dirty="0"/>
               <a:t> → multilingual, clear alerts with explanations.</a:t>
             </a:r>
           </a:p>
           <a:p>
             <a:r>
-              <a:rPr lang="en-IN" sz="1800" b="1" dirty="0"/>
+              <a:rPr lang="en-IN" sz="1600" b="1" dirty="0"/>
               <a:t>IoT/offline support</a:t>
             </a:r>
             <a:r>
-              <a:rPr lang="en-IN" sz="1800" dirty="0"/>
+              <a:rPr lang="en-IN" sz="1600" dirty="0"/>
               <a:t> → cached GPS or smart bands in no-network areas.</a:t>
             </a:r>
           </a:p>
           <a:p>
             <a:r>
-              <a:rPr lang="en-IN" sz="1800" b="1" dirty="0"/>
+              <a:rPr lang="en-IN" sz="1600" b="1" dirty="0"/>
               <a:t>Federated blockchain model</a:t>
             </a:r>
             <a:r>
-              <a:rPr lang="en-IN" sz="1800" dirty="0"/>
+              <a:rPr lang="en-IN" sz="1600" dirty="0"/>
               <a:t> → each state controls its own data node.</a:t>
             </a:r>
           </a:p>
           <a:p>
-            <a:endParaRPr lang="en-IN" sz="1800" dirty="0"/>
+            <a:endParaRPr lang="en-IN" sz="1600" dirty="0"/>
           </a:p>
         </p:txBody>
       </p:sp>
@@ -7960,7 +7831,7 @@
         <p:spPr bwMode="auto">
           <a:xfrm>
             <a:off x="1170039" y="1551563"/>
-            <a:ext cx="9385300" cy="4031873"/>
+            <a:ext cx="9385300" cy="4585871"/>
           </a:xfrm>
           <a:prstGeom prst="rect">
             <a:avLst/>
@@ -8076,18 +7947,14 @@
           </a:p>
           <a:p>
             <a:r>
-              <a:rPr lang="en-IN" b="1"/>
+              <a:rPr lang="en-IN" b="1" dirty="0"/>
               <a:t> </a:t>
             </a:r>
           </a:p>
           <a:p>
             <a:r>
-              <a:rPr lang="en-IN" sz="2000" b="1"/>
-              <a:t>Related </a:t>
-            </a:r>
-            <a:r>
               <a:rPr lang="en-IN" sz="2000" b="1" dirty="0"/>
-              <a:t>Research / Articles</a:t>
+              <a:t>Related Research / Articles</a:t>
             </a:r>
             <a:endParaRPr lang="en-IN" b="1" dirty="0"/>
           </a:p>
@@ -8119,6 +7986,33 @@
             <a:r>
               <a:rPr lang="en-IN" dirty="0"/>
               <a:t>“Tourist Safety and Risk Perception in India” – Journal of Tourism Studies.</a:t>
+            </a:r>
+          </a:p>
+          <a:p>
+            <a:pPr marL="285750" indent="-285750">
+              <a:buFont typeface="Arial" panose="020B0604020202020204" pitchFamily="34" charset="0"/>
+              <a:buChar char="•"/>
+            </a:pPr>
+            <a:endParaRPr lang="en-IN" dirty="0"/>
+          </a:p>
+          <a:p>
+            <a:r>
+              <a:rPr lang="en-IN" b="1" dirty="0" err="1"/>
+              <a:t>Github</a:t>
+            </a:r>
+            <a:r>
+              <a:rPr lang="en-IN" b="1" dirty="0"/>
+              <a:t> Link : </a:t>
+            </a:r>
+            <a:r>
+              <a:rPr lang="en-IN" dirty="0">
+                <a:hlinkClick r:id="rId5"/>
+              </a:rPr>
+              <a:t>https://github.com/Rohit-Solanki-6105/doc-sih-25002</a:t>
+            </a:r>
+            <a:r>
+              <a:rPr lang="en-IN" dirty="0"/>
+              <a:t> </a:t>
             </a:r>
           </a:p>
         </p:txBody>
@@ -8286,7 +8180,7 @@
           <p:nvPr/>
         </p:nvPicPr>
         <p:blipFill>
-          <a:blip r:embed="rId5">
+          <a:blip r:embed="rId6">
             <a:extLst>
               <a:ext uri="{28A0092B-C50C-407E-A947-70E740481C1C}">
                 <a14:useLocalDpi xmlns:a14="http://schemas.microsoft.com/office/drawing/2010/main" val="0"/>
@@ -8373,870 +8267,6 @@
     <p:extLst>
       <p:ext uri="{BB962C8B-B14F-4D97-AF65-F5344CB8AC3E}">
         <p14:creationId xmlns:p14="http://schemas.microsoft.com/office/powerpoint/2010/main" val="3916788613"/>
-      </p:ext>
-    </p:extLst>
-  </p:cSld>
-  <p:clrMapOvr>
-    <a:masterClrMapping/>
-  </p:clrMapOvr>
-</p:sld>
-</file>
-
-<file path=ppt/slides/slide7.xml><?xml version="1.0" encoding="utf-8"?>
-<p:sld xmlns:a="http://schemas.openxmlformats.org/drawingml/2006/main" xmlns:r="http://schemas.openxmlformats.org/officeDocument/2006/relationships" xmlns:p="http://schemas.openxmlformats.org/presentationml/2006/main">
-  <p:cSld>
-    <p:spTree>
-      <p:nvGrpSpPr>
-        <p:cNvPr id="1" name=""/>
-        <p:cNvGrpSpPr/>
-        <p:nvPr/>
-      </p:nvGrpSpPr>
-      <p:grpSpPr>
-        <a:xfrm>
-          <a:off x="0" y="0"/>
-          <a:ext cx="0" cy="0"/>
-          <a:chOff x="0" y="0"/>
-          <a:chExt cx="0" cy="0"/>
-        </a:xfrm>
-      </p:grpSpPr>
-      <p:sp>
-        <p:nvSpPr>
-          <p:cNvPr id="10" name="Rectangle 9">
-            <a:extLst>
-              <a:ext uri="{FF2B5EF4-FFF2-40B4-BE49-F238E27FC236}">
-                <a16:creationId xmlns:a16="http://schemas.microsoft.com/office/drawing/2014/main" id="{AD4F69D3-EEB0-4C4C-9434-B9960FB5854C}"/>
-              </a:ext>
-            </a:extLst>
-          </p:cNvPr>
-          <p:cNvSpPr>
-            <a:spLocks noChangeArrowheads="1"/>
-          </p:cNvSpPr>
-          <p:nvPr/>
-        </p:nvSpPr>
-        <p:spPr bwMode="auto">
-          <a:xfrm>
-            <a:off x="0" y="6354762"/>
-            <a:ext cx="12191999" cy="503238"/>
-          </a:xfrm>
-          <a:prstGeom prst="rect">
-            <a:avLst/>
-          </a:prstGeom>
-          <a:solidFill>
-            <a:srgbClr val="0070C0"/>
-          </a:solidFill>
-          <a:ln w="9525">
-            <a:noFill/>
-            <a:miter lim="800000"/>
-            <a:headEnd/>
-            <a:tailEnd/>
-          </a:ln>
-          <a:effectLst>
-            <a:outerShdw dist="23000" dir="5400000" rotWithShape="0">
-              <a:srgbClr val="808080">
-                <a:alpha val="34999"/>
-              </a:srgbClr>
-            </a:outerShdw>
-          </a:effectLst>
-        </p:spPr>
-        <p:txBody>
-          <a:bodyPr anchor="ctr"/>
-          <a:lstStyle/>
-          <a:p>
-            <a:pPr marL="0" marR="0" lvl="0" indent="0" algn="ctr" defTabSz="457200" rtl="0" eaLnBrk="1" fontAlgn="auto" latinLnBrk="0" hangingPunct="1">
-              <a:lnSpc>
-                <a:spcPct val="100000"/>
-              </a:lnSpc>
-              <a:spcBef>
-                <a:spcPts val="0"/>
-              </a:spcBef>
-              <a:spcAft>
-                <a:spcPts val="0"/>
-              </a:spcAft>
-              <a:buClrTx/>
-              <a:buSzTx/>
-              <a:buFontTx/>
-              <a:buNone/>
-              <a:tabLst/>
-              <a:defRPr/>
-            </a:pPr>
-            <a:endParaRPr kumimoji="0" lang="en-US" sz="1800" b="0" i="0" u="none" strike="noStrike" kern="1200" cap="none" spc="0" normalizeH="0" baseline="0" noProof="0" dirty="0">
-              <a:ln>
-                <a:noFill/>
-              </a:ln>
-              <a:solidFill>
-                <a:srgbClr val="C0504D">
-                  <a:lumMod val="75000"/>
-                </a:srgbClr>
-              </a:solidFill>
-              <a:effectLst/>
-              <a:uLnTx/>
-              <a:uFillTx/>
-              <a:latin typeface="Calibri"/>
-              <a:ea typeface="ＭＳ Ｐゴシック" pitchFamily="1" charset="-128"/>
-              <a:cs typeface="+mn-cs"/>
-            </a:endParaRPr>
-          </a:p>
-        </p:txBody>
-      </p:sp>
-      <p:sp>
-        <p:nvSpPr>
-          <p:cNvPr id="6" name="Slide Number Placeholder 5"/>
-          <p:cNvSpPr>
-            <a:spLocks noGrp="1"/>
-          </p:cNvSpPr>
-          <p:nvPr>
-            <p:ph type="sldNum" sz="quarter" idx="12"/>
-          </p:nvPr>
-        </p:nvSpPr>
-        <p:spPr/>
-        <p:txBody>
-          <a:bodyPr/>
-          <a:lstStyle/>
-          <a:p>
-            <a:pPr marL="0" marR="0" lvl="0" indent="0" algn="r" defTabSz="457200" rtl="0" eaLnBrk="1" fontAlgn="base" latinLnBrk="0" hangingPunct="1">
-              <a:lnSpc>
-                <a:spcPct val="100000"/>
-              </a:lnSpc>
-              <a:spcBef>
-                <a:spcPct val="0"/>
-              </a:spcBef>
-              <a:spcAft>
-                <a:spcPct val="0"/>
-              </a:spcAft>
-              <a:buClrTx/>
-              <a:buSzTx/>
-              <a:buFontTx/>
-              <a:buNone/>
-              <a:tabLst/>
-              <a:defRPr/>
-            </a:pPr>
-            <a:fld id="{677C3CE7-23F7-4828-823C-E0205DF2CF97}" type="slidenum">
-              <a:rPr kumimoji="0" lang="en-US" sz="1200" b="1" i="0" u="none" strike="noStrike" kern="1200" cap="none" spc="0" normalizeH="0" baseline="0" noProof="0">
-                <a:ln>
-                  <a:noFill/>
-                </a:ln>
-                <a:solidFill>
-                  <a:prstClr val="white"/>
-                </a:solidFill>
-                <a:effectLst/>
-                <a:uLnTx/>
-                <a:uFillTx/>
-                <a:latin typeface="TradeGothic" pitchFamily="1" charset="0"/>
-                <a:ea typeface="ＭＳ Ｐゴシック" pitchFamily="1" charset="-128"/>
-                <a:cs typeface="+mn-cs"/>
-              </a:rPr>
-              <a:pPr marL="0" marR="0" lvl="0" indent="0" algn="r" defTabSz="457200" rtl="0" eaLnBrk="1" fontAlgn="base" latinLnBrk="0" hangingPunct="1">
-                <a:lnSpc>
-                  <a:spcPct val="100000"/>
-                </a:lnSpc>
-                <a:spcBef>
-                  <a:spcPct val="0"/>
-                </a:spcBef>
-                <a:spcAft>
-                  <a:spcPct val="0"/>
-                </a:spcAft>
-                <a:buClrTx/>
-                <a:buSzTx/>
-                <a:buFontTx/>
-                <a:buNone/>
-                <a:tabLst/>
-                <a:defRPr/>
-              </a:pPr>
-              <a:t>7</a:t>
-            </a:fld>
-            <a:endParaRPr kumimoji="0" lang="en-US" sz="1200" b="1" i="0" u="none" strike="noStrike" kern="1200" cap="none" spc="0" normalizeH="0" baseline="0" noProof="0" dirty="0">
-              <a:ln>
-                <a:noFill/>
-              </a:ln>
-              <a:solidFill>
-                <a:prstClr val="white"/>
-              </a:solidFill>
-              <a:effectLst/>
-              <a:uLnTx/>
-              <a:uFillTx/>
-              <a:latin typeface="TradeGothic" pitchFamily="1" charset="0"/>
-              <a:ea typeface="ＭＳ Ｐゴシック" pitchFamily="1" charset="-128"/>
-              <a:cs typeface="+mn-cs"/>
-            </a:endParaRPr>
-          </a:p>
-        </p:txBody>
-      </p:sp>
-      <p:sp>
-        <p:nvSpPr>
-          <p:cNvPr id="7" name="Footer Placeholder 6"/>
-          <p:cNvSpPr>
-            <a:spLocks noGrp="1"/>
-          </p:cNvSpPr>
-          <p:nvPr>
-            <p:ph type="ftr" sz="quarter" idx="11"/>
-          </p:nvPr>
-        </p:nvSpPr>
-        <p:spPr>
-          <a:xfrm>
-            <a:off x="4648200" y="6356353"/>
-            <a:ext cx="3204000" cy="365125"/>
-          </a:xfrm>
-        </p:spPr>
-        <p:txBody>
-          <a:bodyPr/>
-          <a:lstStyle/>
-          <a:p>
-            <a:pPr marL="0" marR="0" lvl="0" indent="0" algn="ctr" defTabSz="457200" rtl="0" eaLnBrk="1" fontAlgn="auto" latinLnBrk="0" hangingPunct="1">
-              <a:lnSpc>
-                <a:spcPct val="100000"/>
-              </a:lnSpc>
-              <a:spcBef>
-                <a:spcPts val="0"/>
-              </a:spcBef>
-              <a:spcAft>
-                <a:spcPts val="0"/>
-              </a:spcAft>
-              <a:buClrTx/>
-              <a:buSzTx/>
-              <a:buFontTx/>
-              <a:buNone/>
-              <a:tabLst/>
-              <a:defRPr/>
-            </a:pPr>
-            <a:r>
-              <a:rPr kumimoji="0" lang="en-US" sz="1200" b="0" i="0" u="none" strike="noStrike" kern="1200" cap="none" spc="0" normalizeH="0" baseline="0" noProof="0">
-                <a:ln>
-                  <a:noFill/>
-                </a:ln>
-                <a:solidFill>
-                  <a:prstClr val="white"/>
-                </a:solidFill>
-                <a:effectLst/>
-                <a:uLnTx/>
-                <a:uFillTx/>
-                <a:latin typeface="TradeGothic"/>
-                <a:ea typeface="+mn-ea"/>
-                <a:cs typeface="+mn-cs"/>
-              </a:rPr>
-              <a:t>@SIH Idea submission- Template</a:t>
-            </a:r>
-            <a:endParaRPr kumimoji="0" lang="en-US" sz="1200" b="0" i="0" u="none" strike="noStrike" kern="1200" cap="none" spc="0" normalizeH="0" baseline="0" noProof="0" dirty="0">
-              <a:ln>
-                <a:noFill/>
-              </a:ln>
-              <a:solidFill>
-                <a:prstClr val="white"/>
-              </a:solidFill>
-              <a:effectLst/>
-              <a:uLnTx/>
-              <a:uFillTx/>
-              <a:latin typeface="TradeGothic"/>
-              <a:ea typeface="+mn-ea"/>
-              <a:cs typeface="+mn-cs"/>
-            </a:endParaRPr>
-          </a:p>
-        </p:txBody>
-      </p:sp>
-      <p:sp>
-        <p:nvSpPr>
-          <p:cNvPr id="3" name="Round Diagonal Corner Rectangle 2"/>
-          <p:cNvSpPr/>
-          <p:nvPr/>
-        </p:nvSpPr>
-        <p:spPr>
-          <a:xfrm>
-            <a:off x="0" y="1791032"/>
-            <a:ext cx="12192000" cy="4319200"/>
-          </a:xfrm>
-          <a:prstGeom prst="round2DiagRect">
-            <a:avLst/>
-          </a:prstGeom>
-          <a:solidFill>
-            <a:schemeClr val="accent1">
-              <a:lumMod val="20000"/>
-              <a:lumOff val="80000"/>
-            </a:schemeClr>
-          </a:solidFill>
-          <a:ln w="38100"/>
-        </p:spPr>
-        <p:style>
-          <a:lnRef idx="1">
-            <a:schemeClr val="accent1"/>
-          </a:lnRef>
-          <a:fillRef idx="3">
-            <a:schemeClr val="accent1"/>
-          </a:fillRef>
-          <a:effectRef idx="2">
-            <a:schemeClr val="accent1"/>
-          </a:effectRef>
-          <a:fontRef idx="minor">
-            <a:schemeClr val="lt1"/>
-          </a:fontRef>
-        </p:style>
-        <p:txBody>
-          <a:bodyPr rtlCol="0" anchor="ctr"/>
-          <a:lstStyle/>
-          <a:p>
-            <a:pPr algn="ctr"/>
-            <a:endParaRPr lang="en-IN"/>
-          </a:p>
-        </p:txBody>
-      </p:sp>
-      <p:sp>
-        <p:nvSpPr>
-          <p:cNvPr id="12" name="Google Shape;100;p3"/>
-          <p:cNvSpPr txBox="1"/>
-          <p:nvPr/>
-        </p:nvSpPr>
-        <p:spPr>
-          <a:xfrm>
-            <a:off x="367832" y="1915454"/>
-            <a:ext cx="11764736" cy="4070356"/>
-          </a:xfrm>
-          <a:prstGeom prst="rect">
-            <a:avLst/>
-          </a:prstGeom>
-          <a:noFill/>
-          <a:ln>
-            <a:noFill/>
-          </a:ln>
-        </p:spPr>
-        <p:txBody>
-          <a:bodyPr spcFirstLastPara="1" wrap="square" lIns="91425" tIns="45700" rIns="91425" bIns="45700" anchor="t" anchorCtr="0">
-            <a:noAutofit/>
-          </a:bodyPr>
-          <a:lstStyle/>
-          <a:p>
-            <a:pPr marL="514350" marR="0" lvl="0" indent="-514350" algn="just" rtl="0">
-              <a:lnSpc>
-                <a:spcPct val="90000"/>
-              </a:lnSpc>
-              <a:spcBef>
-                <a:spcPts val="0"/>
-              </a:spcBef>
-              <a:spcAft>
-                <a:spcPts val="0"/>
-              </a:spcAft>
-              <a:buClr>
-                <a:schemeClr val="dk1"/>
-              </a:buClr>
-              <a:buSzPct val="100000"/>
-              <a:buFont typeface="Calibri"/>
-              <a:buAutoNum type="arabicPeriod"/>
-            </a:pPr>
-            <a:r>
-              <a:rPr lang="en-US" b="1" i="0" u="none" strike="noStrike" cap="none" dirty="0">
-                <a:solidFill>
-                  <a:schemeClr val="dk1"/>
-                </a:solidFill>
-                <a:latin typeface="Arial" panose="020B0604020202020204" pitchFamily="34" charset="0"/>
-                <a:ea typeface="Calibri"/>
-                <a:cs typeface="Arial" panose="020B0604020202020204" pitchFamily="34" charset="0"/>
-                <a:sym typeface="Calibri"/>
-              </a:rPr>
-              <a:t>Kindly keep the maximum slides limit up to six </a:t>
-            </a:r>
-            <a:r>
-              <a:rPr lang="en-US" b="1" i="0" u="none" strike="noStrike" cap="none" dirty="0">
-                <a:solidFill>
-                  <a:srgbClr val="C00000"/>
-                </a:solidFill>
-                <a:latin typeface="Arial" panose="020B0604020202020204" pitchFamily="34" charset="0"/>
-                <a:ea typeface="Calibri"/>
-                <a:cs typeface="Arial" panose="020B0604020202020204" pitchFamily="34" charset="0"/>
-                <a:sym typeface="Calibri"/>
-              </a:rPr>
-              <a:t>(6). </a:t>
-            </a:r>
-            <a:r>
-              <a:rPr lang="en-US" b="1" i="0" u="none" strike="noStrike" cap="none" dirty="0">
-                <a:solidFill>
-                  <a:schemeClr val="dk1"/>
-                </a:solidFill>
-                <a:latin typeface="Arial" panose="020B0604020202020204" pitchFamily="34" charset="0"/>
-                <a:ea typeface="Calibri"/>
-                <a:cs typeface="Arial" panose="020B0604020202020204" pitchFamily="34" charset="0"/>
-                <a:sym typeface="Calibri"/>
-              </a:rPr>
-              <a:t>( Including the </a:t>
-            </a:r>
-            <a:r>
-              <a:rPr lang="en-US" b="1" i="0" u="none" strike="noStrike" cap="none">
-                <a:solidFill>
-                  <a:schemeClr val="dk1"/>
-                </a:solidFill>
-                <a:latin typeface="Arial" panose="020B0604020202020204" pitchFamily="34" charset="0"/>
-                <a:ea typeface="Calibri"/>
-                <a:cs typeface="Arial" panose="020B0604020202020204" pitchFamily="34" charset="0"/>
-                <a:sym typeface="Calibri"/>
-              </a:rPr>
-              <a:t>title slide) </a:t>
-            </a:r>
-            <a:endParaRPr b="1" dirty="0">
-              <a:latin typeface="Arial" panose="020B0604020202020204" pitchFamily="34" charset="0"/>
-              <a:cs typeface="Arial" panose="020B0604020202020204" pitchFamily="34" charset="0"/>
-            </a:endParaRPr>
-          </a:p>
-          <a:p>
-            <a:pPr marL="514350" marR="0" lvl="0" indent="-514350" algn="just" rtl="0">
-              <a:lnSpc>
-                <a:spcPct val="90000"/>
-              </a:lnSpc>
-              <a:spcBef>
-                <a:spcPts val="1000"/>
-              </a:spcBef>
-              <a:spcAft>
-                <a:spcPts val="0"/>
-              </a:spcAft>
-              <a:buClr>
-                <a:schemeClr val="dk1"/>
-              </a:buClr>
-              <a:buSzPct val="100000"/>
-              <a:buFont typeface="Calibri"/>
-              <a:buAutoNum type="arabicPeriod"/>
-            </a:pPr>
-            <a:r>
-              <a:rPr lang="en-US" b="1" i="0" u="none" strike="noStrike" cap="none" dirty="0">
-                <a:solidFill>
-                  <a:schemeClr val="dk1"/>
-                </a:solidFill>
-                <a:latin typeface="Arial" panose="020B0604020202020204" pitchFamily="34" charset="0"/>
-                <a:ea typeface="Calibri"/>
-                <a:cs typeface="Arial" panose="020B0604020202020204" pitchFamily="34" charset="0"/>
-                <a:sym typeface="Calibri"/>
-              </a:rPr>
-              <a:t>Try to avoid paragraphs and post your idea in points /diagrams / Infographics /pictures </a:t>
-            </a:r>
-            <a:endParaRPr b="1" dirty="0">
-              <a:latin typeface="Arial" panose="020B0604020202020204" pitchFamily="34" charset="0"/>
-              <a:cs typeface="Arial" panose="020B0604020202020204" pitchFamily="34" charset="0"/>
-            </a:endParaRPr>
-          </a:p>
-          <a:p>
-            <a:pPr marL="514350" marR="0" lvl="0" indent="-514350" algn="just" rtl="0">
-              <a:lnSpc>
-                <a:spcPct val="90000"/>
-              </a:lnSpc>
-              <a:spcBef>
-                <a:spcPts val="1000"/>
-              </a:spcBef>
-              <a:spcAft>
-                <a:spcPts val="0"/>
-              </a:spcAft>
-              <a:buClr>
-                <a:schemeClr val="dk1"/>
-              </a:buClr>
-              <a:buSzPct val="100000"/>
-              <a:buFont typeface="Calibri"/>
-              <a:buAutoNum type="arabicPeriod"/>
-            </a:pPr>
-            <a:r>
-              <a:rPr lang="en-US" b="1" i="0" u="none" strike="noStrike" cap="none" dirty="0">
-                <a:solidFill>
-                  <a:schemeClr val="dk1"/>
-                </a:solidFill>
-                <a:latin typeface="Arial" panose="020B0604020202020204" pitchFamily="34" charset="0"/>
-                <a:ea typeface="Calibri"/>
-                <a:cs typeface="Arial" panose="020B0604020202020204" pitchFamily="34" charset="0"/>
-                <a:sym typeface="Calibri"/>
-              </a:rPr>
-              <a:t>Keep your explanation precise and easy to understand</a:t>
-            </a:r>
-            <a:endParaRPr b="1" dirty="0">
-              <a:latin typeface="Arial" panose="020B0604020202020204" pitchFamily="34" charset="0"/>
-              <a:cs typeface="Arial" panose="020B0604020202020204" pitchFamily="34" charset="0"/>
-            </a:endParaRPr>
-          </a:p>
-          <a:p>
-            <a:pPr marL="514350" marR="0" lvl="0" indent="-514350" algn="just" rtl="0">
-              <a:lnSpc>
-                <a:spcPct val="90000"/>
-              </a:lnSpc>
-              <a:spcBef>
-                <a:spcPts val="1000"/>
-              </a:spcBef>
-              <a:spcAft>
-                <a:spcPts val="0"/>
-              </a:spcAft>
-              <a:buClr>
-                <a:schemeClr val="dk1"/>
-              </a:buClr>
-              <a:buSzPct val="100000"/>
-              <a:buFont typeface="Calibri"/>
-              <a:buAutoNum type="arabicPeriod"/>
-            </a:pPr>
-            <a:r>
-              <a:rPr lang="en-US" b="1" i="0" u="none" strike="noStrike" cap="none" dirty="0">
-                <a:solidFill>
-                  <a:schemeClr val="dk1"/>
-                </a:solidFill>
-                <a:latin typeface="Arial" panose="020B0604020202020204" pitchFamily="34" charset="0"/>
-                <a:ea typeface="Calibri"/>
-                <a:cs typeface="Arial" panose="020B0604020202020204" pitchFamily="34" charset="0"/>
-                <a:sym typeface="Calibri"/>
-              </a:rPr>
-              <a:t>Idea should be unique and novel. </a:t>
-            </a:r>
-            <a:endParaRPr b="1" dirty="0">
-              <a:latin typeface="Arial" panose="020B0604020202020204" pitchFamily="34" charset="0"/>
-              <a:cs typeface="Arial" panose="020B0604020202020204" pitchFamily="34" charset="0"/>
-            </a:endParaRPr>
-          </a:p>
-          <a:p>
-            <a:pPr marL="514350" marR="0" lvl="0" indent="-514350" algn="just" rtl="0">
-              <a:lnSpc>
-                <a:spcPct val="90000"/>
-              </a:lnSpc>
-              <a:spcBef>
-                <a:spcPts val="1000"/>
-              </a:spcBef>
-              <a:spcAft>
-                <a:spcPts val="0"/>
-              </a:spcAft>
-              <a:buClr>
-                <a:schemeClr val="dk1"/>
-              </a:buClr>
-              <a:buSzPct val="100000"/>
-              <a:buFont typeface="Calibri"/>
-              <a:buAutoNum type="arabicPeriod"/>
-            </a:pPr>
-            <a:r>
-              <a:rPr lang="en-US" b="1" i="0" u="none" strike="noStrike" cap="none" dirty="0">
-                <a:solidFill>
-                  <a:schemeClr val="dk1"/>
-                </a:solidFill>
-                <a:latin typeface="Arial" panose="020B0604020202020204" pitchFamily="34" charset="0"/>
-                <a:ea typeface="Calibri"/>
-                <a:cs typeface="Arial" panose="020B0604020202020204" pitchFamily="34" charset="0"/>
-                <a:sym typeface="Calibri"/>
-              </a:rPr>
-              <a:t>You can only use provided </a:t>
-            </a:r>
-            <a:r>
-              <a:rPr lang="en-US" b="1" dirty="0">
-                <a:solidFill>
-                  <a:schemeClr val="dk1"/>
-                </a:solidFill>
-                <a:latin typeface="Arial" panose="020B0604020202020204" pitchFamily="34" charset="0"/>
-                <a:ea typeface="Calibri"/>
-                <a:cs typeface="Arial" panose="020B0604020202020204" pitchFamily="34" charset="0"/>
-                <a:sym typeface="Calibri"/>
-              </a:rPr>
-              <a:t>template</a:t>
-            </a:r>
-            <a:r>
-              <a:rPr lang="en-US" b="1" i="0" u="none" strike="noStrike" cap="none" dirty="0">
-                <a:solidFill>
-                  <a:schemeClr val="dk1"/>
-                </a:solidFill>
-                <a:latin typeface="Arial" panose="020B0604020202020204" pitchFamily="34" charset="0"/>
-                <a:ea typeface="Calibri"/>
-                <a:cs typeface="Arial" panose="020B0604020202020204" pitchFamily="34" charset="0"/>
-                <a:sym typeface="Calibri"/>
-              </a:rPr>
-              <a:t> for making the </a:t>
-            </a:r>
-            <a:r>
-              <a:rPr lang="en-US" b="1" dirty="0">
-                <a:solidFill>
-                  <a:schemeClr val="dk1"/>
-                </a:solidFill>
-                <a:latin typeface="Arial" panose="020B0604020202020204" pitchFamily="34" charset="0"/>
-                <a:ea typeface="Calibri"/>
-                <a:cs typeface="Arial" panose="020B0604020202020204" pitchFamily="34" charset="0"/>
-                <a:sym typeface="Calibri"/>
-              </a:rPr>
-              <a:t>PPT</a:t>
-            </a:r>
-            <a:r>
-              <a:rPr lang="en-US" b="1" i="0" u="none" strike="noStrike" cap="none" dirty="0">
-                <a:solidFill>
-                  <a:schemeClr val="dk1"/>
-                </a:solidFill>
-                <a:latin typeface="Arial" panose="020B0604020202020204" pitchFamily="34" charset="0"/>
-                <a:ea typeface="Calibri"/>
-                <a:cs typeface="Arial" panose="020B0604020202020204" pitchFamily="34" charset="0"/>
-                <a:sym typeface="Calibri"/>
-              </a:rPr>
-              <a:t> without changing the idea details pointers (mentioned in previous slides).</a:t>
-            </a:r>
-            <a:endParaRPr b="1" i="0" u="none" strike="noStrike" cap="none" dirty="0">
-              <a:solidFill>
-                <a:schemeClr val="dk1"/>
-              </a:solidFill>
-              <a:latin typeface="Arial" panose="020B0604020202020204" pitchFamily="34" charset="0"/>
-              <a:ea typeface="Calibri"/>
-              <a:cs typeface="Arial" panose="020B0604020202020204" pitchFamily="34" charset="0"/>
-              <a:sym typeface="Calibri"/>
-            </a:endParaRPr>
-          </a:p>
-          <a:p>
-            <a:pPr marL="514350" marR="0" lvl="0" indent="-514350" algn="just" rtl="0">
-              <a:lnSpc>
-                <a:spcPct val="90000"/>
-              </a:lnSpc>
-              <a:spcBef>
-                <a:spcPts val="1000"/>
-              </a:spcBef>
-              <a:spcAft>
-                <a:spcPts val="0"/>
-              </a:spcAft>
-              <a:buClr>
-                <a:schemeClr val="dk1"/>
-              </a:buClr>
-              <a:buSzPct val="100000"/>
-              <a:buFont typeface="Calibri"/>
-              <a:buAutoNum type="arabicPeriod"/>
-            </a:pPr>
-            <a:r>
-              <a:rPr lang="en-US" b="1" i="0" u="none" strike="noStrike" cap="none" dirty="0">
-                <a:solidFill>
-                  <a:schemeClr val="dk1"/>
-                </a:solidFill>
-                <a:latin typeface="Arial" panose="020B0604020202020204" pitchFamily="34" charset="0"/>
-                <a:ea typeface="Calibri"/>
-                <a:cs typeface="Arial" panose="020B0604020202020204" pitchFamily="34" charset="0"/>
-                <a:sym typeface="Calibri"/>
-              </a:rPr>
-              <a:t>You need to save the file in PDF and upload the same on portal. No PPT, Word Doc or any other format will be supported.</a:t>
-            </a:r>
-            <a:endParaRPr b="1" dirty="0">
-              <a:latin typeface="Arial" panose="020B0604020202020204" pitchFamily="34" charset="0"/>
-              <a:cs typeface="Arial" panose="020B0604020202020204" pitchFamily="34" charset="0"/>
-            </a:endParaRPr>
-          </a:p>
-          <a:p>
-            <a:pPr marL="514350" marR="0" lvl="0" indent="-349885" algn="just" rtl="0">
-              <a:lnSpc>
-                <a:spcPct val="90000"/>
-              </a:lnSpc>
-              <a:spcBef>
-                <a:spcPts val="1000"/>
-              </a:spcBef>
-              <a:spcAft>
-                <a:spcPts val="0"/>
-              </a:spcAft>
-              <a:buClr>
-                <a:schemeClr val="dk1"/>
-              </a:buClr>
-              <a:buSzPct val="100000"/>
-              <a:buFont typeface="Calibri"/>
-              <a:buNone/>
-            </a:pPr>
-            <a:endParaRPr b="1" i="0" u="none" strike="noStrike" cap="none" dirty="0">
-              <a:solidFill>
-                <a:schemeClr val="dk1"/>
-              </a:solidFill>
-              <a:latin typeface="Arial" panose="020B0604020202020204" pitchFamily="34" charset="0"/>
-              <a:ea typeface="Calibri"/>
-              <a:cs typeface="Arial" panose="020B0604020202020204" pitchFamily="34" charset="0"/>
-              <a:sym typeface="Calibri"/>
-            </a:endParaRPr>
-          </a:p>
-          <a:p>
-            <a:pPr marL="0" marR="0" lvl="0" indent="0" algn="just" rtl="0">
-              <a:lnSpc>
-                <a:spcPct val="90000"/>
-              </a:lnSpc>
-              <a:spcBef>
-                <a:spcPts val="1000"/>
-              </a:spcBef>
-              <a:spcAft>
-                <a:spcPts val="0"/>
-              </a:spcAft>
-              <a:buClr>
-                <a:schemeClr val="dk1"/>
-              </a:buClr>
-              <a:buSzPct val="100000"/>
-              <a:buFont typeface="Arial"/>
-              <a:buNone/>
-            </a:pPr>
-            <a:r>
-              <a:rPr lang="en-US" b="1" i="0" u="none" strike="noStrike" cap="none" dirty="0">
-                <a:solidFill>
-                  <a:srgbClr val="C00000"/>
-                </a:solidFill>
-                <a:latin typeface="Arial" panose="020B0604020202020204" pitchFamily="34" charset="0"/>
-                <a:ea typeface="Calibri"/>
-                <a:cs typeface="Arial" panose="020B0604020202020204" pitchFamily="34" charset="0"/>
-                <a:sym typeface="Calibri"/>
-              </a:rPr>
-              <a:t>Note - You can delete this slide (Important Pointers) when you upload the details of your idea on SIH portal.</a:t>
-            </a:r>
-            <a:endParaRPr b="1" dirty="0">
-              <a:solidFill>
-                <a:srgbClr val="C00000"/>
-              </a:solidFill>
-              <a:latin typeface="Arial" panose="020B0604020202020204" pitchFamily="34" charset="0"/>
-              <a:cs typeface="Arial" panose="020B0604020202020204" pitchFamily="34" charset="0"/>
-            </a:endParaRPr>
-          </a:p>
-          <a:p>
-            <a:pPr marL="914400" marR="0" lvl="1" indent="-316230" algn="just" rtl="0">
-              <a:lnSpc>
-                <a:spcPct val="90000"/>
-              </a:lnSpc>
-              <a:spcBef>
-                <a:spcPts val="500"/>
-              </a:spcBef>
-              <a:spcAft>
-                <a:spcPts val="0"/>
-              </a:spcAft>
-              <a:buClr>
-                <a:schemeClr val="dk1"/>
-              </a:buClr>
-              <a:buSzPct val="100000"/>
-              <a:buFont typeface="Calibri"/>
-              <a:buNone/>
-            </a:pPr>
-            <a:endParaRPr sz="2000" b="1" i="0" u="none" strike="noStrike" cap="none" dirty="0">
-              <a:solidFill>
-                <a:schemeClr val="dk1"/>
-              </a:solidFill>
-              <a:latin typeface="Arial" panose="020B0604020202020204" pitchFamily="34" charset="0"/>
-              <a:ea typeface="Calibri"/>
-              <a:cs typeface="Arial" panose="020B0604020202020204" pitchFamily="34" charset="0"/>
-              <a:sym typeface="Calibri"/>
-            </a:endParaRPr>
-          </a:p>
-        </p:txBody>
-      </p:sp>
-      <p:sp>
-        <p:nvSpPr>
-          <p:cNvPr id="4" name="TextBox 3"/>
-          <p:cNvSpPr txBox="1"/>
-          <p:nvPr/>
-        </p:nvSpPr>
-        <p:spPr>
-          <a:xfrm>
-            <a:off x="1393371" y="107066"/>
-            <a:ext cx="8410540" cy="646331"/>
-          </a:xfrm>
-          <a:prstGeom prst="rect">
-            <a:avLst/>
-          </a:prstGeom>
-          <a:noFill/>
-        </p:spPr>
-        <p:txBody>
-          <a:bodyPr wrap="square" rtlCol="0">
-            <a:spAutoFit/>
-          </a:bodyPr>
-          <a:lstStyle/>
-          <a:p>
-            <a:pPr algn="ctr"/>
-            <a:r>
-              <a:rPr lang="en-US" sz="3600" b="1" dirty="0">
-                <a:latin typeface="Times New Roman" panose="02020603050405020304" pitchFamily="18" charset="0"/>
-                <a:cs typeface="Times New Roman" panose="02020603050405020304" pitchFamily="18" charset="0"/>
-              </a:rPr>
-              <a:t>IMPORTANT INSTRUCTIONS</a:t>
-            </a:r>
-            <a:endParaRPr lang="en-IN" sz="3600" b="1" dirty="0">
-              <a:latin typeface="Times New Roman" panose="02020603050405020304" pitchFamily="18" charset="0"/>
-              <a:cs typeface="Times New Roman" panose="02020603050405020304" pitchFamily="18" charset="0"/>
-            </a:endParaRPr>
-          </a:p>
-        </p:txBody>
-      </p:sp>
-      <p:sp>
-        <p:nvSpPr>
-          <p:cNvPr id="5" name="TextBox 4"/>
-          <p:cNvSpPr txBox="1"/>
-          <p:nvPr/>
-        </p:nvSpPr>
-        <p:spPr>
-          <a:xfrm>
-            <a:off x="602343" y="1181900"/>
-            <a:ext cx="9557657" cy="341632"/>
-          </a:xfrm>
-          <a:prstGeom prst="rect">
-            <a:avLst/>
-          </a:prstGeom>
-          <a:noFill/>
-        </p:spPr>
-        <p:txBody>
-          <a:bodyPr wrap="square" rtlCol="0">
-            <a:spAutoFit/>
-          </a:bodyPr>
-          <a:lstStyle/>
-          <a:p>
-            <a:pPr algn="just">
-              <a:lnSpc>
-                <a:spcPct val="90000"/>
-              </a:lnSpc>
-              <a:spcBef>
-                <a:spcPts val="1000"/>
-              </a:spcBef>
-              <a:spcAft>
-                <a:spcPts val="0"/>
-              </a:spcAft>
-              <a:buClr>
-                <a:schemeClr val="dk1"/>
-              </a:buClr>
-              <a:buSzPct val="100000"/>
-            </a:pPr>
-            <a:r>
-              <a:rPr lang="en-US" b="1" dirty="0">
-                <a:solidFill>
-                  <a:schemeClr val="dk1"/>
-                </a:solidFill>
-                <a:latin typeface="Arial" panose="020B0604020202020204" pitchFamily="34" charset="0"/>
-                <a:ea typeface="Calibri"/>
-                <a:cs typeface="Arial" panose="020B0604020202020204" pitchFamily="34" charset="0"/>
-              </a:rPr>
-              <a:t>Please ensure below pointers are met while submitting the Idea PPT:</a:t>
-            </a:r>
-            <a:endParaRPr lang="en-IN" b="1" dirty="0">
-              <a:solidFill>
-                <a:schemeClr val="dk1"/>
-              </a:solidFill>
-              <a:latin typeface="Arial" panose="020B0604020202020204" pitchFamily="34" charset="0"/>
-              <a:ea typeface="Calibri"/>
-              <a:cs typeface="Arial" panose="020B0604020202020204" pitchFamily="34" charset="0"/>
-            </a:endParaRPr>
-          </a:p>
-        </p:txBody>
-      </p:sp>
-      <p:pic>
-        <p:nvPicPr>
-          <p:cNvPr id="11" name="Picture 2" descr="https://www.sih.gov.in/img1/SIH-Logo.png"/>
-          <p:cNvPicPr>
-            <a:picLocks noChangeAspect="1" noChangeArrowheads="1"/>
-          </p:cNvPicPr>
-          <p:nvPr/>
-        </p:nvPicPr>
-        <p:blipFill>
-          <a:blip r:embed="rId3">
-            <a:extLst>
-              <a:ext uri="{28A0092B-C50C-407E-A947-70E740481C1C}">
-                <a14:useLocalDpi xmlns:a14="http://schemas.microsoft.com/office/drawing/2010/main" val="0"/>
-              </a:ext>
-            </a:extLst>
-          </a:blip>
-          <a:srcRect/>
-          <a:stretch>
-            <a:fillRect/>
-          </a:stretch>
-        </p:blipFill>
-        <p:spPr bwMode="auto">
-          <a:xfrm>
-            <a:off x="9841366" y="57097"/>
-            <a:ext cx="2209120" cy="1122868"/>
-          </a:xfrm>
-          <a:prstGeom prst="rect">
-            <a:avLst/>
-          </a:prstGeom>
-          <a:noFill/>
-          <a:extLst>
-            <a:ext uri="{909E8E84-426E-40DD-AFC4-6F175D3DCCD1}">
-              <a14:hiddenFill xmlns:a14="http://schemas.microsoft.com/office/drawing/2010/main">
-                <a:solidFill>
-                  <a:srgbClr val="FFFFFF"/>
-                </a:solidFill>
-              </a14:hiddenFill>
-            </a:ext>
-          </a:extLst>
-        </p:spPr>
-      </p:pic>
-    </p:spTree>
-    <p:extLst>
-      <p:ext uri="{BB962C8B-B14F-4D97-AF65-F5344CB8AC3E}">
-        <p14:creationId xmlns:p14="http://schemas.microsoft.com/office/powerpoint/2010/main" val="1588084416"/>
       </p:ext>
     </p:extLst>
   </p:cSld>

</xml_diff>